<commit_message>
Actualizacion ppts condicionales y pasos para talleres en github
</commit_message>
<xml_diff>
--- a/Pasos_para_acceder_resolver_taller_offline.pptx
+++ b/Pasos_para_acceder_resolver_taller_offline.pptx
@@ -15,6 +15,11 @@
     <p:sldId id="279" r:id="rId9"/>
     <p:sldId id="280" r:id="rId10"/>
     <p:sldId id="281" r:id="rId11"/>
+    <p:sldId id="282" r:id="rId12"/>
+    <p:sldId id="283" r:id="rId13"/>
+    <p:sldId id="284" r:id="rId14"/>
+    <p:sldId id="285" r:id="rId15"/>
+    <p:sldId id="286" r:id="rId16"/>
   </p:sldIdLst>
   <p:sldSz cx="12192000" cy="6858000"/>
   <p:notesSz cx="6858000" cy="9144000"/>
@@ -113,7 +118,453 @@
       </a:defRPr>
     </a:lvl9pPr>
   </p:defaultTextStyle>
+  <p:extLst>
+    <p:ext uri="{EFAFB233-063F-42B5-8137-9DF3F51BA10A}">
+      <p15:sldGuideLst xmlns:p15="http://schemas.microsoft.com/office/powerpoint/2012/main"/>
+    </p:ext>
+  </p:extLst>
 </p:presentation>
+</file>
+
+<file path=ppt/changesInfos/changesInfo1.xml><?xml version="1.0" encoding="utf-8"?>
+<pc:chgInfo xmlns:a="http://schemas.openxmlformats.org/drawingml/2006/main" xmlns:r="http://schemas.openxmlformats.org/officeDocument/2006/relationships" xmlns:ac="http://schemas.microsoft.com/office/drawing/2013/main/command" xmlns:pc="http://schemas.microsoft.com/office/powerpoint/2013/main/command">
+  <pc:docChgLst>
+    <pc:chgData name="Cesar Augusto Lopez Gallego" userId="0dfa9112-9251-4882-b472-cf2dfcee09d1" providerId="ADAL" clId="{04314BE0-1986-498F-ABA8-18E8A9D0C79A}"/>
+    <pc:docChg chg="undo custSel addSld modSld">
+      <pc:chgData name="Cesar Augusto Lopez Gallego" userId="0dfa9112-9251-4882-b472-cf2dfcee09d1" providerId="ADAL" clId="{04314BE0-1986-498F-ABA8-18E8A9D0C79A}" dt="2024-07-30T14:42:25.299" v="1096" actId="1076"/>
+      <pc:docMkLst>
+        <pc:docMk/>
+      </pc:docMkLst>
+      <pc:sldChg chg="addSp delSp modSp new mod">
+        <pc:chgData name="Cesar Augusto Lopez Gallego" userId="0dfa9112-9251-4882-b472-cf2dfcee09d1" providerId="ADAL" clId="{04314BE0-1986-498F-ABA8-18E8A9D0C79A}" dt="2024-07-29T23:33:12.452" v="447" actId="1076"/>
+        <pc:sldMkLst>
+          <pc:docMk/>
+          <pc:sldMk cId="2155304117" sldId="282"/>
+        </pc:sldMkLst>
+        <pc:spChg chg="mod">
+          <ac:chgData name="Cesar Augusto Lopez Gallego" userId="0dfa9112-9251-4882-b472-cf2dfcee09d1" providerId="ADAL" clId="{04314BE0-1986-498F-ABA8-18E8A9D0C79A}" dt="2024-07-29T23:33:12.452" v="447" actId="1076"/>
+          <ac:spMkLst>
+            <pc:docMk/>
+            <pc:sldMk cId="2155304117" sldId="282"/>
+            <ac:spMk id="2" creationId="{C0E40C2D-631F-4B30-99C3-D5190E5FB5AE}"/>
+          </ac:spMkLst>
+        </pc:spChg>
+        <pc:spChg chg="del">
+          <ac:chgData name="Cesar Augusto Lopez Gallego" userId="0dfa9112-9251-4882-b472-cf2dfcee09d1" providerId="ADAL" clId="{04314BE0-1986-498F-ABA8-18E8A9D0C79A}" dt="2024-07-29T23:23:44.934" v="109" actId="478"/>
+          <ac:spMkLst>
+            <pc:docMk/>
+            <pc:sldMk cId="2155304117" sldId="282"/>
+            <ac:spMk id="3" creationId="{D9EF8043-885E-4FA8-9428-52FD55965162}"/>
+          </ac:spMkLst>
+        </pc:spChg>
+        <pc:spChg chg="add mod">
+          <ac:chgData name="Cesar Augusto Lopez Gallego" userId="0dfa9112-9251-4882-b472-cf2dfcee09d1" providerId="ADAL" clId="{04314BE0-1986-498F-ABA8-18E8A9D0C79A}" dt="2024-07-29T23:29:43.949" v="380" actId="20577"/>
+          <ac:spMkLst>
+            <pc:docMk/>
+            <pc:sldMk cId="2155304117" sldId="282"/>
+            <ac:spMk id="4" creationId="{D507A261-3DAA-47B5-9941-7AA7A20CAB6A}"/>
+          </ac:spMkLst>
+        </pc:spChg>
+        <pc:spChg chg="add del">
+          <ac:chgData name="Cesar Augusto Lopez Gallego" userId="0dfa9112-9251-4882-b472-cf2dfcee09d1" providerId="ADAL" clId="{04314BE0-1986-498F-ABA8-18E8A9D0C79A}" dt="2024-07-29T23:24:27.907" v="195" actId="22"/>
+          <ac:spMkLst>
+            <pc:docMk/>
+            <pc:sldMk cId="2155304117" sldId="282"/>
+            <ac:spMk id="6" creationId="{48BAEBCA-8696-4425-8BDF-2A78D5132DF9}"/>
+          </ac:spMkLst>
+        </pc:spChg>
+        <pc:spChg chg="add mod">
+          <ac:chgData name="Cesar Augusto Lopez Gallego" userId="0dfa9112-9251-4882-b472-cf2dfcee09d1" providerId="ADAL" clId="{04314BE0-1986-498F-ABA8-18E8A9D0C79A}" dt="2024-07-29T23:28:44.089" v="239" actId="1582"/>
+          <ac:spMkLst>
+            <pc:docMk/>
+            <pc:sldMk cId="2155304117" sldId="282"/>
+            <ac:spMk id="11" creationId="{808BEE56-9E5C-412F-9711-FE80FEDE3FC4}"/>
+          </ac:spMkLst>
+        </pc:spChg>
+        <pc:spChg chg="add mod">
+          <ac:chgData name="Cesar Augusto Lopez Gallego" userId="0dfa9112-9251-4882-b472-cf2dfcee09d1" providerId="ADAL" clId="{04314BE0-1986-498F-ABA8-18E8A9D0C79A}" dt="2024-07-29T23:30:38.599" v="385" actId="1076"/>
+          <ac:spMkLst>
+            <pc:docMk/>
+            <pc:sldMk cId="2155304117" sldId="282"/>
+            <ac:spMk id="12" creationId="{FEC90738-E77F-4D80-AB40-E0586418A78D}"/>
+          </ac:spMkLst>
+        </pc:spChg>
+        <pc:spChg chg="add mod">
+          <ac:chgData name="Cesar Augusto Lopez Gallego" userId="0dfa9112-9251-4882-b472-cf2dfcee09d1" providerId="ADAL" clId="{04314BE0-1986-498F-ABA8-18E8A9D0C79A}" dt="2024-07-29T23:31:14.402" v="399" actId="113"/>
+          <ac:spMkLst>
+            <pc:docMk/>
+            <pc:sldMk cId="2155304117" sldId="282"/>
+            <ac:spMk id="13" creationId="{7C4B4DAA-6091-45F6-97D9-F0AD5CB04C75}"/>
+          </ac:spMkLst>
+        </pc:spChg>
+        <pc:spChg chg="add mod">
+          <ac:chgData name="Cesar Augusto Lopez Gallego" userId="0dfa9112-9251-4882-b472-cf2dfcee09d1" providerId="ADAL" clId="{04314BE0-1986-498F-ABA8-18E8A9D0C79A}" dt="2024-07-29T23:32:35.747" v="443" actId="207"/>
+          <ac:spMkLst>
+            <pc:docMk/>
+            <pc:sldMk cId="2155304117" sldId="282"/>
+            <ac:spMk id="16" creationId="{C10EE1F2-C06A-4DC5-A482-64E1DA7C586F}"/>
+          </ac:spMkLst>
+        </pc:spChg>
+        <pc:picChg chg="add mod">
+          <ac:chgData name="Cesar Augusto Lopez Gallego" userId="0dfa9112-9251-4882-b472-cf2dfcee09d1" providerId="ADAL" clId="{04314BE0-1986-498F-ABA8-18E8A9D0C79A}" dt="2024-07-29T23:25:09.111" v="199" actId="1076"/>
+          <ac:picMkLst>
+            <pc:docMk/>
+            <pc:sldMk cId="2155304117" sldId="282"/>
+            <ac:picMk id="8" creationId="{1B27AECB-1E89-48FB-8316-3088CF05F9E6}"/>
+          </ac:picMkLst>
+        </pc:picChg>
+        <pc:picChg chg="add mod">
+          <ac:chgData name="Cesar Augusto Lopez Gallego" userId="0dfa9112-9251-4882-b472-cf2dfcee09d1" providerId="ADAL" clId="{04314BE0-1986-498F-ABA8-18E8A9D0C79A}" dt="2024-07-29T23:31:21.022" v="400" actId="13822"/>
+          <ac:picMkLst>
+            <pc:docMk/>
+            <pc:sldMk cId="2155304117" sldId="282"/>
+            <ac:picMk id="10" creationId="{21505260-0E9B-44CA-A77F-EB7FC85D492A}"/>
+          </ac:picMkLst>
+        </pc:picChg>
+        <pc:cxnChg chg="add mod">
+          <ac:chgData name="Cesar Augusto Lopez Gallego" userId="0dfa9112-9251-4882-b472-cf2dfcee09d1" providerId="ADAL" clId="{04314BE0-1986-498F-ABA8-18E8A9D0C79A}" dt="2024-07-29T23:31:43.349" v="403" actId="208"/>
+          <ac:cxnSpMkLst>
+            <pc:docMk/>
+            <pc:sldMk cId="2155304117" sldId="282"/>
+            <ac:cxnSpMk id="15" creationId="{67414351-825A-4E05-B60D-C8D42DC33A20}"/>
+          </ac:cxnSpMkLst>
+        </pc:cxnChg>
+      </pc:sldChg>
+      <pc:sldChg chg="addSp delSp modSp new mod">
+        <pc:chgData name="Cesar Augusto Lopez Gallego" userId="0dfa9112-9251-4882-b472-cf2dfcee09d1" providerId="ADAL" clId="{04314BE0-1986-498F-ABA8-18E8A9D0C79A}" dt="2024-07-29T23:38:42.847" v="514" actId="14100"/>
+        <pc:sldMkLst>
+          <pc:docMk/>
+          <pc:sldMk cId="1379626659" sldId="283"/>
+        </pc:sldMkLst>
+        <pc:spChg chg="del">
+          <ac:chgData name="Cesar Augusto Lopez Gallego" userId="0dfa9112-9251-4882-b472-cf2dfcee09d1" providerId="ADAL" clId="{04314BE0-1986-498F-ABA8-18E8A9D0C79A}" dt="2024-07-29T23:33:08.374" v="445" actId="478"/>
+          <ac:spMkLst>
+            <pc:docMk/>
+            <pc:sldMk cId="1379626659" sldId="283"/>
+            <ac:spMk id="2" creationId="{BF69842E-E1FD-495C-8559-DAF24586AC15}"/>
+          </ac:spMkLst>
+        </pc:spChg>
+        <pc:spChg chg="del mod">
+          <ac:chgData name="Cesar Augusto Lopez Gallego" userId="0dfa9112-9251-4882-b472-cf2dfcee09d1" providerId="ADAL" clId="{04314BE0-1986-498F-ABA8-18E8A9D0C79A}" dt="2024-07-29T23:33:18.123" v="451" actId="478"/>
+          <ac:spMkLst>
+            <pc:docMk/>
+            <pc:sldMk cId="1379626659" sldId="283"/>
+            <ac:spMk id="3" creationId="{D4433335-AA9F-4A91-ABED-4E27DE428C14}"/>
+          </ac:spMkLst>
+        </pc:spChg>
+        <pc:spChg chg="add mod">
+          <ac:chgData name="Cesar Augusto Lopez Gallego" userId="0dfa9112-9251-4882-b472-cf2dfcee09d1" providerId="ADAL" clId="{04314BE0-1986-498F-ABA8-18E8A9D0C79A}" dt="2024-07-29T23:33:14.678" v="448"/>
+          <ac:spMkLst>
+            <pc:docMk/>
+            <pc:sldMk cId="1379626659" sldId="283"/>
+            <ac:spMk id="4" creationId="{B17E6A1C-F390-4491-980B-A1A9046805F0}"/>
+          </ac:spMkLst>
+        </pc:spChg>
+        <pc:spChg chg="add mod">
+          <ac:chgData name="Cesar Augusto Lopez Gallego" userId="0dfa9112-9251-4882-b472-cf2dfcee09d1" providerId="ADAL" clId="{04314BE0-1986-498F-ABA8-18E8A9D0C79A}" dt="2024-07-29T23:38:30.922" v="511" actId="14100"/>
+          <ac:spMkLst>
+            <pc:docMk/>
+            <pc:sldMk cId="1379626659" sldId="283"/>
+            <ac:spMk id="7" creationId="{F71DDA34-1A22-4F1D-8467-21D50CD6BF4C}"/>
+          </ac:spMkLst>
+        </pc:spChg>
+        <pc:picChg chg="add mod">
+          <ac:chgData name="Cesar Augusto Lopez Gallego" userId="0dfa9112-9251-4882-b472-cf2dfcee09d1" providerId="ADAL" clId="{04314BE0-1986-498F-ABA8-18E8A9D0C79A}" dt="2024-07-29T23:37:07.691" v="504" actId="14100"/>
+          <ac:picMkLst>
+            <pc:docMk/>
+            <pc:sldMk cId="1379626659" sldId="283"/>
+            <ac:picMk id="6" creationId="{7B4350D3-1D99-417D-B766-D24F45A0A343}"/>
+          </ac:picMkLst>
+        </pc:picChg>
+        <pc:picChg chg="add mod">
+          <ac:chgData name="Cesar Augusto Lopez Gallego" userId="0dfa9112-9251-4882-b472-cf2dfcee09d1" providerId="ADAL" clId="{04314BE0-1986-498F-ABA8-18E8A9D0C79A}" dt="2024-07-29T23:37:17.803" v="507" actId="1076"/>
+          <ac:picMkLst>
+            <pc:docMk/>
+            <pc:sldMk cId="1379626659" sldId="283"/>
+            <ac:picMk id="9" creationId="{C96EE99B-0571-49A1-BE74-6EA900BCA810}"/>
+          </ac:picMkLst>
+        </pc:picChg>
+        <pc:cxnChg chg="add mod">
+          <ac:chgData name="Cesar Augusto Lopez Gallego" userId="0dfa9112-9251-4882-b472-cf2dfcee09d1" providerId="ADAL" clId="{04314BE0-1986-498F-ABA8-18E8A9D0C79A}" dt="2024-07-29T23:37:34.194" v="510" actId="1582"/>
+          <ac:cxnSpMkLst>
+            <pc:docMk/>
+            <pc:sldMk cId="1379626659" sldId="283"/>
+            <ac:cxnSpMk id="11" creationId="{1F75877E-4DAA-4735-8D67-705096013C88}"/>
+          </ac:cxnSpMkLst>
+        </pc:cxnChg>
+        <pc:cxnChg chg="add mod">
+          <ac:chgData name="Cesar Augusto Lopez Gallego" userId="0dfa9112-9251-4882-b472-cf2dfcee09d1" providerId="ADAL" clId="{04314BE0-1986-498F-ABA8-18E8A9D0C79A}" dt="2024-07-29T23:38:42.847" v="514" actId="14100"/>
+          <ac:cxnSpMkLst>
+            <pc:docMk/>
+            <pc:sldMk cId="1379626659" sldId="283"/>
+            <ac:cxnSpMk id="12" creationId="{5DD7C709-4A19-4AF7-AA83-67DF591DCFB1}"/>
+          </ac:cxnSpMkLst>
+        </pc:cxnChg>
+      </pc:sldChg>
+      <pc:sldChg chg="addSp delSp modSp new mod">
+        <pc:chgData name="Cesar Augusto Lopez Gallego" userId="0dfa9112-9251-4882-b472-cf2dfcee09d1" providerId="ADAL" clId="{04314BE0-1986-498F-ABA8-18E8A9D0C79A}" dt="2024-07-29T23:42:53.953" v="706" actId="1076"/>
+        <pc:sldMkLst>
+          <pc:docMk/>
+          <pc:sldMk cId="102662072" sldId="284"/>
+        </pc:sldMkLst>
+        <pc:spChg chg="del">
+          <ac:chgData name="Cesar Augusto Lopez Gallego" userId="0dfa9112-9251-4882-b472-cf2dfcee09d1" providerId="ADAL" clId="{04314BE0-1986-498F-ABA8-18E8A9D0C79A}" dt="2024-07-29T23:40:24.625" v="518" actId="478"/>
+          <ac:spMkLst>
+            <pc:docMk/>
+            <pc:sldMk cId="102662072" sldId="284"/>
+            <ac:spMk id="2" creationId="{01359973-C43A-4B25-A457-FCC94CAEA2DE}"/>
+          </ac:spMkLst>
+        </pc:spChg>
+        <pc:spChg chg="del">
+          <ac:chgData name="Cesar Augusto Lopez Gallego" userId="0dfa9112-9251-4882-b472-cf2dfcee09d1" providerId="ADAL" clId="{04314BE0-1986-498F-ABA8-18E8A9D0C79A}" dt="2024-07-29T23:40:24.625" v="518" actId="478"/>
+          <ac:spMkLst>
+            <pc:docMk/>
+            <pc:sldMk cId="102662072" sldId="284"/>
+            <ac:spMk id="3" creationId="{3AC5A680-B24D-4664-A17A-1AE36A313A93}"/>
+          </ac:spMkLst>
+        </pc:spChg>
+        <pc:spChg chg="add del mod">
+          <ac:chgData name="Cesar Augusto Lopez Gallego" userId="0dfa9112-9251-4882-b472-cf2dfcee09d1" providerId="ADAL" clId="{04314BE0-1986-498F-ABA8-18E8A9D0C79A}" dt="2024-07-29T23:40:22.183" v="517"/>
+          <ac:spMkLst>
+            <pc:docMk/>
+            <pc:sldMk cId="102662072" sldId="284"/>
+            <ac:spMk id="4" creationId="{C0A2DE8C-3966-4304-BF49-316964477067}"/>
+          </ac:spMkLst>
+        </pc:spChg>
+        <pc:spChg chg="add mod">
+          <ac:chgData name="Cesar Augusto Lopez Gallego" userId="0dfa9112-9251-4882-b472-cf2dfcee09d1" providerId="ADAL" clId="{04314BE0-1986-498F-ABA8-18E8A9D0C79A}" dt="2024-07-29T23:40:49.609" v="580" actId="20577"/>
+          <ac:spMkLst>
+            <pc:docMk/>
+            <pc:sldMk cId="102662072" sldId="284"/>
+            <ac:spMk id="5" creationId="{5FFF397D-20F7-4A47-B4F1-D5D28C4A99CD}"/>
+          </ac:spMkLst>
+        </pc:spChg>
+        <pc:spChg chg="add mod">
+          <ac:chgData name="Cesar Augusto Lopez Gallego" userId="0dfa9112-9251-4882-b472-cf2dfcee09d1" providerId="ADAL" clId="{04314BE0-1986-498F-ABA8-18E8A9D0C79A}" dt="2024-07-29T23:42:10.216" v="618" actId="207"/>
+          <ac:spMkLst>
+            <pc:docMk/>
+            <pc:sldMk cId="102662072" sldId="284"/>
+            <ac:spMk id="6" creationId="{D0AF1578-FBD4-4D6B-ABF3-1D7F353BC427}"/>
+          </ac:spMkLst>
+        </pc:spChg>
+        <pc:spChg chg="add mod">
+          <ac:chgData name="Cesar Augusto Lopez Gallego" userId="0dfa9112-9251-4882-b472-cf2dfcee09d1" providerId="ADAL" clId="{04314BE0-1986-498F-ABA8-18E8A9D0C79A}" dt="2024-07-29T23:42:53.953" v="706" actId="1076"/>
+          <ac:spMkLst>
+            <pc:docMk/>
+            <pc:sldMk cId="102662072" sldId="284"/>
+            <ac:spMk id="8" creationId="{04FDF15D-5619-43D0-AC75-0DF1687366F0}"/>
+          </ac:spMkLst>
+        </pc:spChg>
+        <pc:picChg chg="add mod">
+          <ac:chgData name="Cesar Augusto Lopez Gallego" userId="0dfa9112-9251-4882-b472-cf2dfcee09d1" providerId="ADAL" clId="{04314BE0-1986-498F-ABA8-18E8A9D0C79A}" dt="2024-07-29T23:41:26.071" v="584" actId="1076"/>
+          <ac:picMkLst>
+            <pc:docMk/>
+            <pc:sldMk cId="102662072" sldId="284"/>
+            <ac:picMk id="1026" creationId="{99A28508-3F9E-4387-9B71-7003CEA1ADF0}"/>
+          </ac:picMkLst>
+        </pc:picChg>
+      </pc:sldChg>
+      <pc:sldChg chg="addSp delSp modSp new mod">
+        <pc:chgData name="Cesar Augusto Lopez Gallego" userId="0dfa9112-9251-4882-b472-cf2dfcee09d1" providerId="ADAL" clId="{04314BE0-1986-498F-ABA8-18E8A9D0C79A}" dt="2024-07-30T14:32:52.958" v="778" actId="1582"/>
+        <pc:sldMkLst>
+          <pc:docMk/>
+          <pc:sldMk cId="3710720232" sldId="285"/>
+        </pc:sldMkLst>
+        <pc:spChg chg="del mod">
+          <ac:chgData name="Cesar Augusto Lopez Gallego" userId="0dfa9112-9251-4882-b472-cf2dfcee09d1" providerId="ADAL" clId="{04314BE0-1986-498F-ABA8-18E8A9D0C79A}" dt="2024-07-29T23:45:33.601" v="768" actId="478"/>
+          <ac:spMkLst>
+            <pc:docMk/>
+            <pc:sldMk cId="3710720232" sldId="285"/>
+            <ac:spMk id="2" creationId="{06BA6BE7-B971-40BE-BEBF-727D47EDF1CE}"/>
+          </ac:spMkLst>
+        </pc:spChg>
+        <pc:spChg chg="del">
+          <ac:chgData name="Cesar Augusto Lopez Gallego" userId="0dfa9112-9251-4882-b472-cf2dfcee09d1" providerId="ADAL" clId="{04314BE0-1986-498F-ABA8-18E8A9D0C79A}" dt="2024-07-29T23:43:19.078" v="708" actId="478"/>
+          <ac:spMkLst>
+            <pc:docMk/>
+            <pc:sldMk cId="3710720232" sldId="285"/>
+            <ac:spMk id="3" creationId="{945A9A92-78DC-4D3A-B6CB-9FB40F9D93EF}"/>
+          </ac:spMkLst>
+        </pc:spChg>
+        <pc:spChg chg="add mod">
+          <ac:chgData name="Cesar Augusto Lopez Gallego" userId="0dfa9112-9251-4882-b472-cf2dfcee09d1" providerId="ADAL" clId="{04314BE0-1986-498F-ABA8-18E8A9D0C79A}" dt="2024-07-30T14:32:34.364" v="771" actId="1076"/>
+          <ac:spMkLst>
+            <pc:docMk/>
+            <pc:sldMk cId="3710720232" sldId="285"/>
+            <ac:spMk id="5" creationId="{862CC499-CC3B-4AEC-88EB-61B6F4A3FEBE}"/>
+          </ac:spMkLst>
+        </pc:spChg>
+        <pc:spChg chg="add mod">
+          <ac:chgData name="Cesar Augusto Lopez Gallego" userId="0dfa9112-9251-4882-b472-cf2dfcee09d1" providerId="ADAL" clId="{04314BE0-1986-498F-ABA8-18E8A9D0C79A}" dt="2024-07-30T14:32:34.364" v="771" actId="1076"/>
+          <ac:spMkLst>
+            <pc:docMk/>
+            <pc:sldMk cId="3710720232" sldId="285"/>
+            <ac:spMk id="8" creationId="{39BD4229-5782-49CC-B621-686655D2F1FA}"/>
+          </ac:spMkLst>
+        </pc:spChg>
+        <pc:spChg chg="add mod">
+          <ac:chgData name="Cesar Augusto Lopez Gallego" userId="0dfa9112-9251-4882-b472-cf2dfcee09d1" providerId="ADAL" clId="{04314BE0-1986-498F-ABA8-18E8A9D0C79A}" dt="2024-07-30T14:32:28.702" v="770" actId="1076"/>
+          <ac:spMkLst>
+            <pc:docMk/>
+            <pc:sldMk cId="3710720232" sldId="285"/>
+            <ac:spMk id="9" creationId="{9DDE2B5A-3D57-4D4F-9B1B-D243D14C205D}"/>
+          </ac:spMkLst>
+        </pc:spChg>
+        <pc:picChg chg="add mod">
+          <ac:chgData name="Cesar Augusto Lopez Gallego" userId="0dfa9112-9251-4882-b472-cf2dfcee09d1" providerId="ADAL" clId="{04314BE0-1986-498F-ABA8-18E8A9D0C79A}" dt="2024-07-30T14:32:39.199" v="775" actId="1076"/>
+          <ac:picMkLst>
+            <pc:docMk/>
+            <pc:sldMk cId="3710720232" sldId="285"/>
+            <ac:picMk id="7" creationId="{3EA25E9C-88A7-42AA-B294-322EA975E86F}"/>
+          </ac:picMkLst>
+        </pc:picChg>
+        <pc:picChg chg="add mod">
+          <ac:chgData name="Cesar Augusto Lopez Gallego" userId="0dfa9112-9251-4882-b472-cf2dfcee09d1" providerId="ADAL" clId="{04314BE0-1986-498F-ABA8-18E8A9D0C79A}" dt="2024-07-30T14:32:34.364" v="771" actId="1076"/>
+          <ac:picMkLst>
+            <pc:docMk/>
+            <pc:sldMk cId="3710720232" sldId="285"/>
+            <ac:picMk id="2050" creationId="{76EBA8C0-110B-4C61-B7FC-F9FA214E74F6}"/>
+          </ac:picMkLst>
+        </pc:picChg>
+        <pc:cxnChg chg="add mod">
+          <ac:chgData name="Cesar Augusto Lopez Gallego" userId="0dfa9112-9251-4882-b472-cf2dfcee09d1" providerId="ADAL" clId="{04314BE0-1986-498F-ABA8-18E8A9D0C79A}" dt="2024-07-30T14:32:52.958" v="778" actId="1582"/>
+          <ac:cxnSpMkLst>
+            <pc:docMk/>
+            <pc:sldMk cId="3710720232" sldId="285"/>
+            <ac:cxnSpMk id="3" creationId="{E32D983C-39C6-4413-ACAB-2B7F721E7FD2}"/>
+          </ac:cxnSpMkLst>
+        </pc:cxnChg>
+        <pc:cxnChg chg="add mod">
+          <ac:chgData name="Cesar Augusto Lopez Gallego" userId="0dfa9112-9251-4882-b472-cf2dfcee09d1" providerId="ADAL" clId="{04314BE0-1986-498F-ABA8-18E8A9D0C79A}" dt="2024-07-30T14:32:34.364" v="771" actId="1076"/>
+          <ac:cxnSpMkLst>
+            <pc:docMk/>
+            <pc:sldMk cId="3710720232" sldId="285"/>
+            <ac:cxnSpMk id="6" creationId="{32605948-3DA4-4DCC-B6D0-4306DE34C3D4}"/>
+          </ac:cxnSpMkLst>
+        </pc:cxnChg>
+      </pc:sldChg>
+      <pc:sldChg chg="addSp delSp modSp new mod">
+        <pc:chgData name="Cesar Augusto Lopez Gallego" userId="0dfa9112-9251-4882-b472-cf2dfcee09d1" providerId="ADAL" clId="{04314BE0-1986-498F-ABA8-18E8A9D0C79A}" dt="2024-07-30T14:42:25.299" v="1096" actId="1076"/>
+        <pc:sldMkLst>
+          <pc:docMk/>
+          <pc:sldMk cId="2632171139" sldId="286"/>
+        </pc:sldMkLst>
+        <pc:spChg chg="del">
+          <ac:chgData name="Cesar Augusto Lopez Gallego" userId="0dfa9112-9251-4882-b472-cf2dfcee09d1" providerId="ADAL" clId="{04314BE0-1986-498F-ABA8-18E8A9D0C79A}" dt="2024-07-30T14:33:08.354" v="781" actId="478"/>
+          <ac:spMkLst>
+            <pc:docMk/>
+            <pc:sldMk cId="2632171139" sldId="286"/>
+            <ac:spMk id="2" creationId="{5F39C5FE-0117-4366-9E82-F35DEA663566}"/>
+          </ac:spMkLst>
+        </pc:spChg>
+        <pc:spChg chg="del">
+          <ac:chgData name="Cesar Augusto Lopez Gallego" userId="0dfa9112-9251-4882-b472-cf2dfcee09d1" providerId="ADAL" clId="{04314BE0-1986-498F-ABA8-18E8A9D0C79A}" dt="2024-07-30T14:33:24.261" v="846" actId="478"/>
+          <ac:spMkLst>
+            <pc:docMk/>
+            <pc:sldMk cId="2632171139" sldId="286"/>
+            <ac:spMk id="3" creationId="{4FF694BB-1809-407A-AEAC-FABD08D918F4}"/>
+          </ac:spMkLst>
+        </pc:spChg>
+        <pc:spChg chg="add mod">
+          <ac:chgData name="Cesar Augusto Lopez Gallego" userId="0dfa9112-9251-4882-b472-cf2dfcee09d1" providerId="ADAL" clId="{04314BE0-1986-498F-ABA8-18E8A9D0C79A}" dt="2024-07-30T14:33:21.597" v="845" actId="20577"/>
+          <ac:spMkLst>
+            <pc:docMk/>
+            <pc:sldMk cId="2632171139" sldId="286"/>
+            <ac:spMk id="4" creationId="{1F0488B3-AAD4-4DF3-855C-4A0E42FB8601}"/>
+          </ac:spMkLst>
+        </pc:spChg>
+        <pc:spChg chg="add mod">
+          <ac:chgData name="Cesar Augusto Lopez Gallego" userId="0dfa9112-9251-4882-b472-cf2dfcee09d1" providerId="ADAL" clId="{04314BE0-1986-498F-ABA8-18E8A9D0C79A}" dt="2024-07-30T14:39:39.871" v="930" actId="1076"/>
+          <ac:spMkLst>
+            <pc:docMk/>
+            <pc:sldMk cId="2632171139" sldId="286"/>
+            <ac:spMk id="7" creationId="{FFA9DB32-0661-46F0-8942-1B81EFFC3C33}"/>
+          </ac:spMkLst>
+        </pc:spChg>
+        <pc:spChg chg="add mod">
+          <ac:chgData name="Cesar Augusto Lopez Gallego" userId="0dfa9112-9251-4882-b472-cf2dfcee09d1" providerId="ADAL" clId="{04314BE0-1986-498F-ABA8-18E8A9D0C79A}" dt="2024-07-30T14:39:42.990" v="931" actId="1076"/>
+          <ac:spMkLst>
+            <pc:docMk/>
+            <pc:sldMk cId="2632171139" sldId="286"/>
+            <ac:spMk id="8" creationId="{49E2AB0B-FAC0-48EB-AD27-1B1E27C879BC}"/>
+          </ac:spMkLst>
+        </pc:spChg>
+        <pc:spChg chg="add mod">
+          <ac:chgData name="Cesar Augusto Lopez Gallego" userId="0dfa9112-9251-4882-b472-cf2dfcee09d1" providerId="ADAL" clId="{04314BE0-1986-498F-ABA8-18E8A9D0C79A}" dt="2024-07-30T14:40:35.455" v="1010" actId="21"/>
+          <ac:spMkLst>
+            <pc:docMk/>
+            <pc:sldMk cId="2632171139" sldId="286"/>
+            <ac:spMk id="13" creationId="{D42E6BA6-D8EE-4513-8AC9-4279DC7D1E67}"/>
+          </ac:spMkLst>
+        </pc:spChg>
+        <pc:spChg chg="add mod">
+          <ac:chgData name="Cesar Augusto Lopez Gallego" userId="0dfa9112-9251-4882-b472-cf2dfcee09d1" providerId="ADAL" clId="{04314BE0-1986-498F-ABA8-18E8A9D0C79A}" dt="2024-07-30T14:41:25.004" v="1068" actId="14100"/>
+          <ac:spMkLst>
+            <pc:docMk/>
+            <pc:sldMk cId="2632171139" sldId="286"/>
+            <ac:spMk id="15" creationId="{293CF942-10A2-4AE2-939B-1FBF8F13C9D1}"/>
+          </ac:spMkLst>
+        </pc:spChg>
+        <pc:spChg chg="add mod">
+          <ac:chgData name="Cesar Augusto Lopez Gallego" userId="0dfa9112-9251-4882-b472-cf2dfcee09d1" providerId="ADAL" clId="{04314BE0-1986-498F-ABA8-18E8A9D0C79A}" dt="2024-07-30T14:42:07.669" v="1079" actId="1582"/>
+          <ac:spMkLst>
+            <pc:docMk/>
+            <pc:sldMk cId="2632171139" sldId="286"/>
+            <ac:spMk id="21" creationId="{F5E6BDE3-CBC3-4DD5-8823-39003F6FA1E4}"/>
+          </ac:spMkLst>
+        </pc:spChg>
+        <pc:spChg chg="add mod">
+          <ac:chgData name="Cesar Augusto Lopez Gallego" userId="0dfa9112-9251-4882-b472-cf2dfcee09d1" providerId="ADAL" clId="{04314BE0-1986-498F-ABA8-18E8A9D0C79A}" dt="2024-07-30T14:42:25.299" v="1096" actId="1076"/>
+          <ac:spMkLst>
+            <pc:docMk/>
+            <pc:sldMk cId="2632171139" sldId="286"/>
+            <ac:spMk id="22" creationId="{6DA11069-A8D2-4D3B-BCC6-80356370B44B}"/>
+          </ac:spMkLst>
+        </pc:spChg>
+        <pc:picChg chg="add mod">
+          <ac:chgData name="Cesar Augusto Lopez Gallego" userId="0dfa9112-9251-4882-b472-cf2dfcee09d1" providerId="ADAL" clId="{04314BE0-1986-498F-ABA8-18E8A9D0C79A}" dt="2024-07-30T14:39:37.207" v="929" actId="14100"/>
+          <ac:picMkLst>
+            <pc:docMk/>
+            <pc:sldMk cId="2632171139" sldId="286"/>
+            <ac:picMk id="6" creationId="{7BBE63E5-3938-4B67-9D65-FCB80699AC3E}"/>
+          </ac:picMkLst>
+        </pc:picChg>
+        <pc:picChg chg="add mod">
+          <ac:chgData name="Cesar Augusto Lopez Gallego" userId="0dfa9112-9251-4882-b472-cf2dfcee09d1" providerId="ADAL" clId="{04314BE0-1986-498F-ABA8-18E8A9D0C79A}" dt="2024-07-30T14:39:47.877" v="932" actId="1076"/>
+          <ac:picMkLst>
+            <pc:docMk/>
+            <pc:sldMk cId="2632171139" sldId="286"/>
+            <ac:picMk id="10" creationId="{CDF1DEA8-DEE8-4486-AD36-897C09EEDE0B}"/>
+          </ac:picMkLst>
+        </pc:picChg>
+        <pc:picChg chg="add mod">
+          <ac:chgData name="Cesar Augusto Lopez Gallego" userId="0dfa9112-9251-4882-b472-cf2dfcee09d1" providerId="ADAL" clId="{04314BE0-1986-498F-ABA8-18E8A9D0C79A}" dt="2024-07-30T14:41:30.579" v="1071" actId="1076"/>
+          <ac:picMkLst>
+            <pc:docMk/>
+            <pc:sldMk cId="2632171139" sldId="286"/>
+            <ac:picMk id="17" creationId="{A9E5F335-20F5-497A-BD86-81D3782A6C7B}"/>
+          </ac:picMkLst>
+        </pc:picChg>
+        <pc:cxnChg chg="add mod">
+          <ac:chgData name="Cesar Augusto Lopez Gallego" userId="0dfa9112-9251-4882-b472-cf2dfcee09d1" providerId="ADAL" clId="{04314BE0-1986-498F-ABA8-18E8A9D0C79A}" dt="2024-07-30T14:39:58.955" v="934" actId="1582"/>
+          <ac:cxnSpMkLst>
+            <pc:docMk/>
+            <pc:sldMk cId="2632171139" sldId="286"/>
+            <ac:cxnSpMk id="12" creationId="{0F016BC9-E6B9-4917-B852-A3B005632869}"/>
+          </ac:cxnSpMkLst>
+        </pc:cxnChg>
+        <pc:cxnChg chg="add mod">
+          <ac:chgData name="Cesar Augusto Lopez Gallego" userId="0dfa9112-9251-4882-b472-cf2dfcee09d1" providerId="ADAL" clId="{04314BE0-1986-498F-ABA8-18E8A9D0C79A}" dt="2024-07-30T14:41:40.855" v="1074" actId="14100"/>
+          <ac:cxnSpMkLst>
+            <pc:docMk/>
+            <pc:sldMk cId="2632171139" sldId="286"/>
+            <ac:cxnSpMk id="18" creationId="{02AE57FB-8FB8-4F1C-86E5-734B64501E6D}"/>
+          </ac:cxnSpMkLst>
+        </pc:cxnChg>
+      </pc:sldChg>
+    </pc:docChg>
+  </pc:docChgLst>
+</pc:chgInfo>
 </file>
 
 <file path=ppt/slideLayouts/slideLayout1.xml><?xml version="1.0" encoding="utf-8"?>
@@ -265,7 +716,7 @@
           <a:p>
             <a:fld id="{CD5A0C60-16CB-40B0-BCBC-AD270A50D8E1}" type="datetimeFigureOut">
               <a:rPr lang="es-CO" smtClean="0"/>
-              <a:t>25/07/2024</a:t>
+              <a:t>30/07/2024</a:t>
             </a:fld>
             <a:endParaRPr lang="es-CO"/>
           </a:p>
@@ -465,7 +916,7 @@
           <a:p>
             <a:fld id="{CD5A0C60-16CB-40B0-BCBC-AD270A50D8E1}" type="datetimeFigureOut">
               <a:rPr lang="es-CO" smtClean="0"/>
-              <a:t>25/07/2024</a:t>
+              <a:t>30/07/2024</a:t>
             </a:fld>
             <a:endParaRPr lang="es-CO"/>
           </a:p>
@@ -675,7 +1126,7 @@
           <a:p>
             <a:fld id="{CD5A0C60-16CB-40B0-BCBC-AD270A50D8E1}" type="datetimeFigureOut">
               <a:rPr lang="es-CO" smtClean="0"/>
-              <a:t>25/07/2024</a:t>
+              <a:t>30/07/2024</a:t>
             </a:fld>
             <a:endParaRPr lang="es-CO"/>
           </a:p>
@@ -875,7 +1326,7 @@
           <a:p>
             <a:fld id="{CD5A0C60-16CB-40B0-BCBC-AD270A50D8E1}" type="datetimeFigureOut">
               <a:rPr lang="es-CO" smtClean="0"/>
-              <a:t>25/07/2024</a:t>
+              <a:t>30/07/2024</a:t>
             </a:fld>
             <a:endParaRPr lang="es-CO"/>
           </a:p>
@@ -1151,7 +1602,7 @@
           <a:p>
             <a:fld id="{CD5A0C60-16CB-40B0-BCBC-AD270A50D8E1}" type="datetimeFigureOut">
               <a:rPr lang="es-CO" smtClean="0"/>
-              <a:t>25/07/2024</a:t>
+              <a:t>30/07/2024</a:t>
             </a:fld>
             <a:endParaRPr lang="es-CO"/>
           </a:p>
@@ -1419,7 +1870,7 @@
           <a:p>
             <a:fld id="{CD5A0C60-16CB-40B0-BCBC-AD270A50D8E1}" type="datetimeFigureOut">
               <a:rPr lang="es-CO" smtClean="0"/>
-              <a:t>25/07/2024</a:t>
+              <a:t>30/07/2024</a:t>
             </a:fld>
             <a:endParaRPr lang="es-CO"/>
           </a:p>
@@ -1834,7 +2285,7 @@
           <a:p>
             <a:fld id="{CD5A0C60-16CB-40B0-BCBC-AD270A50D8E1}" type="datetimeFigureOut">
               <a:rPr lang="es-CO" smtClean="0"/>
-              <a:t>25/07/2024</a:t>
+              <a:t>30/07/2024</a:t>
             </a:fld>
             <a:endParaRPr lang="es-CO"/>
           </a:p>
@@ -1976,7 +2427,7 @@
           <a:p>
             <a:fld id="{CD5A0C60-16CB-40B0-BCBC-AD270A50D8E1}" type="datetimeFigureOut">
               <a:rPr lang="es-CO" smtClean="0"/>
-              <a:t>25/07/2024</a:t>
+              <a:t>30/07/2024</a:t>
             </a:fld>
             <a:endParaRPr lang="es-CO"/>
           </a:p>
@@ -2089,7 +2540,7 @@
           <a:p>
             <a:fld id="{CD5A0C60-16CB-40B0-BCBC-AD270A50D8E1}" type="datetimeFigureOut">
               <a:rPr lang="es-CO" smtClean="0"/>
-              <a:t>25/07/2024</a:t>
+              <a:t>30/07/2024</a:t>
             </a:fld>
             <a:endParaRPr lang="es-CO"/>
           </a:p>
@@ -2402,7 +2853,7 @@
           <a:p>
             <a:fld id="{CD5A0C60-16CB-40B0-BCBC-AD270A50D8E1}" type="datetimeFigureOut">
               <a:rPr lang="es-CO" smtClean="0"/>
-              <a:t>25/07/2024</a:t>
+              <a:t>30/07/2024</a:t>
             </a:fld>
             <a:endParaRPr lang="es-CO"/>
           </a:p>
@@ -2691,7 +3142,7 @@
           <a:p>
             <a:fld id="{CD5A0C60-16CB-40B0-BCBC-AD270A50D8E1}" type="datetimeFigureOut">
               <a:rPr lang="es-CO" smtClean="0"/>
-              <a:t>25/07/2024</a:t>
+              <a:t>30/07/2024</a:t>
             </a:fld>
             <a:endParaRPr lang="es-CO"/>
           </a:p>
@@ -2934,7 +3385,7 @@
           <a:p>
             <a:fld id="{CD5A0C60-16CB-40B0-BCBC-AD270A50D8E1}" type="datetimeFigureOut">
               <a:rPr lang="es-CO" smtClean="0"/>
-              <a:t>25/07/2024</a:t>
+              <a:t>30/07/2024</a:t>
             </a:fld>
             <a:endParaRPr lang="es-CO"/>
           </a:p>
@@ -4217,6 +4668,1758 @@
     <p:extLst>
       <p:ext uri="{BB962C8B-B14F-4D97-AF65-F5344CB8AC3E}">
         <p14:creationId xmlns:p14="http://schemas.microsoft.com/office/powerpoint/2010/main" val="28229920"/>
+      </p:ext>
+    </p:extLst>
+  </p:cSld>
+  <p:clrMapOvr>
+    <a:masterClrMapping/>
+  </p:clrMapOvr>
+</p:sld>
+</file>
+
+<file path=ppt/slides/slide11.xml><?xml version="1.0" encoding="utf-8"?>
+<p:sld xmlns:a="http://schemas.openxmlformats.org/drawingml/2006/main" xmlns:r="http://schemas.openxmlformats.org/officeDocument/2006/relationships" xmlns:p="http://schemas.openxmlformats.org/presentationml/2006/main">
+  <p:cSld>
+    <p:spTree>
+      <p:nvGrpSpPr>
+        <p:cNvPr id="1" name=""/>
+        <p:cNvGrpSpPr/>
+        <p:nvPr/>
+      </p:nvGrpSpPr>
+      <p:grpSpPr>
+        <a:xfrm>
+          <a:off x="0" y="0"/>
+          <a:ext cx="0" cy="0"/>
+          <a:chOff x="0" y="0"/>
+          <a:chExt cx="0" cy="0"/>
+        </a:xfrm>
+      </p:grpSpPr>
+      <p:sp>
+        <p:nvSpPr>
+          <p:cNvPr id="2" name="Título 1">
+            <a:extLst>
+              <a:ext uri="{FF2B5EF4-FFF2-40B4-BE49-F238E27FC236}">
+                <a16:creationId xmlns:a16="http://schemas.microsoft.com/office/drawing/2014/main" id="{C0E40C2D-631F-4B30-99C3-D5190E5FB5AE}"/>
+              </a:ext>
+            </a:extLst>
+          </p:cNvPr>
+          <p:cNvSpPr>
+            <a:spLocks noGrp="1"/>
+          </p:cNvSpPr>
+          <p:nvPr>
+            <p:ph type="title"/>
+          </p:nvPr>
+        </p:nvSpPr>
+        <p:spPr>
+          <a:xfrm>
+            <a:off x="838200" y="306560"/>
+            <a:ext cx="10515600" cy="1325563"/>
+          </a:xfrm>
+        </p:spPr>
+        <p:txBody>
+          <a:bodyPr>
+            <a:normAutofit/>
+          </a:bodyPr>
+          <a:lstStyle/>
+          <a:p>
+            <a:r>
+              <a:rPr lang="es-ES" sz="3600" dirty="0"/>
+              <a:t>Cómo Interpretar el correo con la retroalimentación que se da por medio de </a:t>
+            </a:r>
+            <a:r>
+              <a:rPr lang="es-ES" sz="3600" dirty="0" err="1"/>
+              <a:t>github</a:t>
+            </a:r>
+            <a:endParaRPr lang="es-CO" sz="3600" dirty="0"/>
+          </a:p>
+        </p:txBody>
+      </p:sp>
+      <p:sp>
+        <p:nvSpPr>
+          <p:cNvPr id="4" name="CuadroTexto 3">
+            <a:extLst>
+              <a:ext uri="{FF2B5EF4-FFF2-40B4-BE49-F238E27FC236}">
+                <a16:creationId xmlns:a16="http://schemas.microsoft.com/office/drawing/2014/main" id="{D507A261-3DAA-47B5-9941-7AA7A20CAB6A}"/>
+              </a:ext>
+            </a:extLst>
+          </p:cNvPr>
+          <p:cNvSpPr txBox="1"/>
+          <p:nvPr/>
+        </p:nvSpPr>
+        <p:spPr>
+          <a:xfrm flipH="1">
+            <a:off x="883918" y="2332234"/>
+            <a:ext cx="10335461" cy="369332"/>
+          </a:xfrm>
+          <a:prstGeom prst="rect">
+            <a:avLst/>
+          </a:prstGeom>
+          <a:noFill/>
+        </p:spPr>
+        <p:txBody>
+          <a:bodyPr wrap="square" rtlCol="0">
+            <a:spAutoFit/>
+          </a:bodyPr>
+          <a:lstStyle/>
+          <a:p>
+            <a:r>
+              <a:rPr lang="es-ES" dirty="0"/>
+              <a:t>Luego de cada </a:t>
+            </a:r>
+            <a:r>
+              <a:rPr lang="es-ES" dirty="0" err="1"/>
+              <a:t>commit</a:t>
+            </a:r>
+            <a:r>
+              <a:rPr lang="es-ES" dirty="0"/>
+              <a:t> y luego de unos minutos les va a llegar un correo similar a este que dice:</a:t>
+            </a:r>
+          </a:p>
+        </p:txBody>
+      </p:sp>
+      <p:pic>
+        <p:nvPicPr>
+          <p:cNvPr id="8" name="Imagen 7">
+            <a:extLst>
+              <a:ext uri="{FF2B5EF4-FFF2-40B4-BE49-F238E27FC236}">
+                <a16:creationId xmlns:a16="http://schemas.microsoft.com/office/drawing/2014/main" id="{1B27AECB-1E89-48FB-8316-3088CF05F9E6}"/>
+              </a:ext>
+            </a:extLst>
+          </p:cNvPr>
+          <p:cNvPicPr>
+            <a:picLocks noChangeAspect="1"/>
+          </p:cNvPicPr>
+          <p:nvPr/>
+        </p:nvPicPr>
+        <p:blipFill>
+          <a:blip r:embed="rId2"/>
+          <a:stretch>
+            <a:fillRect/>
+          </a:stretch>
+        </p:blipFill>
+        <p:spPr>
+          <a:xfrm>
+            <a:off x="1374759" y="2973780"/>
+            <a:ext cx="9733939" cy="369332"/>
+          </a:xfrm>
+          <a:prstGeom prst="rect">
+            <a:avLst/>
+          </a:prstGeom>
+        </p:spPr>
+      </p:pic>
+      <p:pic>
+        <p:nvPicPr>
+          <p:cNvPr id="10" name="Imagen 9">
+            <a:extLst>
+              <a:ext uri="{FF2B5EF4-FFF2-40B4-BE49-F238E27FC236}">
+                <a16:creationId xmlns:a16="http://schemas.microsoft.com/office/drawing/2014/main" id="{21505260-0E9B-44CA-A77F-EB7FC85D492A}"/>
+              </a:ext>
+            </a:extLst>
+          </p:cNvPr>
+          <p:cNvPicPr>
+            <a:picLocks noChangeAspect="1"/>
+          </p:cNvPicPr>
+          <p:nvPr/>
+        </p:nvPicPr>
+        <p:blipFill>
+          <a:blip r:embed="rId3"/>
+          <a:stretch>
+            <a:fillRect/>
+          </a:stretch>
+        </p:blipFill>
+        <p:spPr>
+          <a:xfrm>
+            <a:off x="1890445" y="3697303"/>
+            <a:ext cx="3896722" cy="2795572"/>
+          </a:xfrm>
+          <a:prstGeom prst="rect">
+            <a:avLst/>
+          </a:prstGeom>
+        </p:spPr>
+        <p:style>
+          <a:lnRef idx="2">
+            <a:schemeClr val="dk1"/>
+          </a:lnRef>
+          <a:fillRef idx="1">
+            <a:schemeClr val="lt1"/>
+          </a:fillRef>
+          <a:effectRef idx="0">
+            <a:schemeClr val="dk1"/>
+          </a:effectRef>
+          <a:fontRef idx="minor">
+            <a:schemeClr val="dk1"/>
+          </a:fontRef>
+        </p:style>
+      </p:pic>
+      <p:sp>
+        <p:nvSpPr>
+          <p:cNvPr id="11" name="Elipse 10">
+            <a:extLst>
+              <a:ext uri="{FF2B5EF4-FFF2-40B4-BE49-F238E27FC236}">
+                <a16:creationId xmlns:a16="http://schemas.microsoft.com/office/drawing/2014/main" id="{808BEE56-9E5C-412F-9711-FE80FEDE3FC4}"/>
+              </a:ext>
+            </a:extLst>
+          </p:cNvPr>
+          <p:cNvSpPr/>
+          <p:nvPr/>
+        </p:nvSpPr>
+        <p:spPr>
+          <a:xfrm>
+            <a:off x="6647380" y="2701566"/>
+            <a:ext cx="2989780" cy="813323"/>
+          </a:xfrm>
+          <a:prstGeom prst="ellipse">
+            <a:avLst/>
+          </a:prstGeom>
+          <a:noFill/>
+          <a:ln w="38100">
+            <a:solidFill>
+              <a:srgbClr val="C00000"/>
+            </a:solidFill>
+          </a:ln>
+        </p:spPr>
+        <p:style>
+          <a:lnRef idx="2">
+            <a:schemeClr val="accent1">
+              <a:shade val="50000"/>
+            </a:schemeClr>
+          </a:lnRef>
+          <a:fillRef idx="1">
+            <a:schemeClr val="accent1"/>
+          </a:fillRef>
+          <a:effectRef idx="0">
+            <a:schemeClr val="accent1"/>
+          </a:effectRef>
+          <a:fontRef idx="minor">
+            <a:schemeClr val="lt1"/>
+          </a:fontRef>
+        </p:style>
+        <p:txBody>
+          <a:bodyPr rtlCol="0" anchor="ctr"/>
+          <a:lstStyle/>
+          <a:p>
+            <a:pPr algn="ctr"/>
+            <a:endParaRPr lang="es-CO"/>
+          </a:p>
+        </p:txBody>
+      </p:sp>
+      <p:sp>
+        <p:nvSpPr>
+          <p:cNvPr id="12" name="CuadroTexto 11">
+            <a:extLst>
+              <a:ext uri="{FF2B5EF4-FFF2-40B4-BE49-F238E27FC236}">
+                <a16:creationId xmlns:a16="http://schemas.microsoft.com/office/drawing/2014/main" id="{FEC90738-E77F-4D80-AB40-E0586418A78D}"/>
+              </a:ext>
+            </a:extLst>
+          </p:cNvPr>
+          <p:cNvSpPr txBox="1"/>
+          <p:nvPr/>
+        </p:nvSpPr>
+        <p:spPr>
+          <a:xfrm flipH="1">
+            <a:off x="8142270" y="3514889"/>
+            <a:ext cx="3694074" cy="646331"/>
+          </a:xfrm>
+          <a:prstGeom prst="rect">
+            <a:avLst/>
+          </a:prstGeom>
+          <a:noFill/>
+        </p:spPr>
+        <p:txBody>
+          <a:bodyPr wrap="square" rtlCol="0">
+            <a:spAutoFit/>
+          </a:bodyPr>
+          <a:lstStyle/>
+          <a:p>
+            <a:r>
+              <a:rPr lang="es-ES" b="1" dirty="0">
+                <a:solidFill>
+                  <a:srgbClr val="C00000"/>
+                </a:solidFill>
+              </a:rPr>
+              <a:t>Puede llegar a bandeja de spam o de </a:t>
+            </a:r>
+            <a:r>
+              <a:rPr lang="es-ES" b="1" dirty="0" err="1">
+                <a:solidFill>
+                  <a:srgbClr val="C00000"/>
+                </a:solidFill>
+              </a:rPr>
+              <a:t>otros..revisar</a:t>
+            </a:r>
+            <a:r>
+              <a:rPr lang="es-ES" b="1" dirty="0">
+                <a:solidFill>
+                  <a:srgbClr val="C00000"/>
+                </a:solidFill>
+              </a:rPr>
+              <a:t> todas las bandejas </a:t>
+            </a:r>
+            <a:endParaRPr lang="es-CO" b="1" dirty="0">
+              <a:solidFill>
+                <a:srgbClr val="C00000"/>
+              </a:solidFill>
+            </a:endParaRPr>
+          </a:p>
+        </p:txBody>
+      </p:sp>
+      <p:sp>
+        <p:nvSpPr>
+          <p:cNvPr id="13" name="CuadroTexto 12">
+            <a:extLst>
+              <a:ext uri="{FF2B5EF4-FFF2-40B4-BE49-F238E27FC236}">
+                <a16:creationId xmlns:a16="http://schemas.microsoft.com/office/drawing/2014/main" id="{7C4B4DAA-6091-45F6-97D9-F0AD5CB04C75}"/>
+              </a:ext>
+            </a:extLst>
+          </p:cNvPr>
+          <p:cNvSpPr txBox="1"/>
+          <p:nvPr/>
+        </p:nvSpPr>
+        <p:spPr>
+          <a:xfrm flipH="1">
+            <a:off x="477233" y="4592548"/>
+            <a:ext cx="1146083" cy="369332"/>
+          </a:xfrm>
+          <a:prstGeom prst="rect">
+            <a:avLst/>
+          </a:prstGeom>
+          <a:noFill/>
+        </p:spPr>
+        <p:txBody>
+          <a:bodyPr wrap="square" rtlCol="0">
+            <a:spAutoFit/>
+          </a:bodyPr>
+          <a:lstStyle/>
+          <a:p>
+            <a:r>
+              <a:rPr lang="es-ES" b="1" dirty="0"/>
+              <a:t>Al abrirlo</a:t>
+            </a:r>
+            <a:endParaRPr lang="es-CO" b="1" dirty="0"/>
+          </a:p>
+        </p:txBody>
+      </p:sp>
+      <p:cxnSp>
+        <p:nvCxnSpPr>
+          <p:cNvPr id="15" name="Conector recto de flecha 14">
+            <a:extLst>
+              <a:ext uri="{FF2B5EF4-FFF2-40B4-BE49-F238E27FC236}">
+                <a16:creationId xmlns:a16="http://schemas.microsoft.com/office/drawing/2014/main" id="{67414351-825A-4E05-B60D-C8D42DC33A20}"/>
+              </a:ext>
+            </a:extLst>
+          </p:cNvPr>
+          <p:cNvCxnSpPr/>
+          <p:nvPr/>
+        </p:nvCxnSpPr>
+        <p:spPr>
+          <a:xfrm>
+            <a:off x="4746661" y="5589142"/>
+            <a:ext cx="3195263" cy="0"/>
+          </a:xfrm>
+          <a:prstGeom prst="straightConnector1">
+            <a:avLst/>
+          </a:prstGeom>
+          <a:ln w="38100">
+            <a:solidFill>
+              <a:srgbClr val="00B050"/>
+            </a:solidFill>
+            <a:tailEnd type="triangle"/>
+          </a:ln>
+        </p:spPr>
+        <p:style>
+          <a:lnRef idx="1">
+            <a:schemeClr val="accent1"/>
+          </a:lnRef>
+          <a:fillRef idx="0">
+            <a:schemeClr val="accent1"/>
+          </a:fillRef>
+          <a:effectRef idx="0">
+            <a:schemeClr val="accent1"/>
+          </a:effectRef>
+          <a:fontRef idx="minor">
+            <a:schemeClr val="tx1"/>
+          </a:fontRef>
+        </p:style>
+      </p:cxnSp>
+      <p:sp>
+        <p:nvSpPr>
+          <p:cNvPr id="16" name="CuadroTexto 15">
+            <a:extLst>
+              <a:ext uri="{FF2B5EF4-FFF2-40B4-BE49-F238E27FC236}">
+                <a16:creationId xmlns:a16="http://schemas.microsoft.com/office/drawing/2014/main" id="{C10EE1F2-C06A-4DC5-A482-64E1DA7C586F}"/>
+              </a:ext>
+            </a:extLst>
+          </p:cNvPr>
+          <p:cNvSpPr txBox="1"/>
+          <p:nvPr/>
+        </p:nvSpPr>
+        <p:spPr>
+          <a:xfrm>
+            <a:off x="8010418" y="5338552"/>
+            <a:ext cx="2944061" cy="369332"/>
+          </a:xfrm>
+          <a:prstGeom prst="rect">
+            <a:avLst/>
+          </a:prstGeom>
+          <a:noFill/>
+        </p:spPr>
+        <p:txBody>
+          <a:bodyPr wrap="square" rtlCol="0">
+            <a:spAutoFit/>
+          </a:bodyPr>
+          <a:lstStyle/>
+          <a:p>
+            <a:r>
+              <a:rPr lang="es-ES" b="1" dirty="0">
+                <a:solidFill>
+                  <a:srgbClr val="00B050"/>
+                </a:solidFill>
+              </a:rPr>
+              <a:t>Hacer clic para ver qué pasó</a:t>
+            </a:r>
+            <a:endParaRPr lang="es-CO" b="1" dirty="0">
+              <a:solidFill>
+                <a:srgbClr val="00B050"/>
+              </a:solidFill>
+            </a:endParaRPr>
+          </a:p>
+        </p:txBody>
+      </p:sp>
+    </p:spTree>
+    <p:extLst>
+      <p:ext uri="{BB962C8B-B14F-4D97-AF65-F5344CB8AC3E}">
+        <p14:creationId xmlns:p14="http://schemas.microsoft.com/office/powerpoint/2010/main" val="2155304117"/>
+      </p:ext>
+    </p:extLst>
+  </p:cSld>
+  <p:clrMapOvr>
+    <a:masterClrMapping/>
+  </p:clrMapOvr>
+</p:sld>
+</file>
+
+<file path=ppt/slides/slide12.xml><?xml version="1.0" encoding="utf-8"?>
+<p:sld xmlns:a="http://schemas.openxmlformats.org/drawingml/2006/main" xmlns:r="http://schemas.openxmlformats.org/officeDocument/2006/relationships" xmlns:p="http://schemas.openxmlformats.org/presentationml/2006/main">
+  <p:cSld>
+    <p:spTree>
+      <p:nvGrpSpPr>
+        <p:cNvPr id="1" name=""/>
+        <p:cNvGrpSpPr/>
+        <p:nvPr/>
+      </p:nvGrpSpPr>
+      <p:grpSpPr>
+        <a:xfrm>
+          <a:off x="0" y="0"/>
+          <a:ext cx="0" cy="0"/>
+          <a:chOff x="0" y="0"/>
+          <a:chExt cx="0" cy="0"/>
+        </a:xfrm>
+      </p:grpSpPr>
+      <p:sp>
+        <p:nvSpPr>
+          <p:cNvPr id="4" name="Título 1">
+            <a:extLst>
+              <a:ext uri="{FF2B5EF4-FFF2-40B4-BE49-F238E27FC236}">
+                <a16:creationId xmlns:a16="http://schemas.microsoft.com/office/drawing/2014/main" id="{B17E6A1C-F390-4491-980B-A1A9046805F0}"/>
+              </a:ext>
+            </a:extLst>
+          </p:cNvPr>
+          <p:cNvSpPr>
+            <a:spLocks noGrp="1"/>
+          </p:cNvSpPr>
+          <p:nvPr>
+            <p:ph type="title"/>
+          </p:nvPr>
+        </p:nvSpPr>
+        <p:spPr>
+          <a:xfrm>
+            <a:off x="838200" y="306560"/>
+            <a:ext cx="10515600" cy="1325563"/>
+          </a:xfrm>
+        </p:spPr>
+        <p:txBody>
+          <a:bodyPr>
+            <a:normAutofit/>
+          </a:bodyPr>
+          <a:lstStyle/>
+          <a:p>
+            <a:r>
+              <a:rPr lang="es-ES" sz="3600" dirty="0"/>
+              <a:t>Cómo Interpretar el correo con la retroalimentación que se da por medio de </a:t>
+            </a:r>
+            <a:r>
+              <a:rPr lang="es-ES" sz="3600" dirty="0" err="1"/>
+              <a:t>github</a:t>
+            </a:r>
+            <a:endParaRPr lang="es-CO" sz="3600" dirty="0"/>
+          </a:p>
+        </p:txBody>
+      </p:sp>
+      <p:pic>
+        <p:nvPicPr>
+          <p:cNvPr id="6" name="Imagen 5">
+            <a:extLst>
+              <a:ext uri="{FF2B5EF4-FFF2-40B4-BE49-F238E27FC236}">
+                <a16:creationId xmlns:a16="http://schemas.microsoft.com/office/drawing/2014/main" id="{7B4350D3-1D99-417D-B766-D24F45A0A343}"/>
+              </a:ext>
+            </a:extLst>
+          </p:cNvPr>
+          <p:cNvPicPr>
+            <a:picLocks noChangeAspect="1"/>
+          </p:cNvPicPr>
+          <p:nvPr/>
+        </p:nvPicPr>
+        <p:blipFill>
+          <a:blip r:embed="rId2"/>
+          <a:stretch>
+            <a:fillRect/>
+          </a:stretch>
+        </p:blipFill>
+        <p:spPr>
+          <a:xfrm>
+            <a:off x="838200" y="1893672"/>
+            <a:ext cx="6425629" cy="3068839"/>
+          </a:xfrm>
+          <a:prstGeom prst="rect">
+            <a:avLst/>
+          </a:prstGeom>
+        </p:spPr>
+      </p:pic>
+      <p:sp>
+        <p:nvSpPr>
+          <p:cNvPr id="7" name="CuadroTexto 6">
+            <a:extLst>
+              <a:ext uri="{FF2B5EF4-FFF2-40B4-BE49-F238E27FC236}">
+                <a16:creationId xmlns:a16="http://schemas.microsoft.com/office/drawing/2014/main" id="{F71DDA34-1A22-4F1D-8467-21D50CD6BF4C}"/>
+              </a:ext>
+            </a:extLst>
+          </p:cNvPr>
+          <p:cNvSpPr txBox="1"/>
+          <p:nvPr/>
+        </p:nvSpPr>
+        <p:spPr>
+          <a:xfrm flipH="1">
+            <a:off x="384765" y="4479532"/>
+            <a:ext cx="1783082" cy="646331"/>
+          </a:xfrm>
+          <a:prstGeom prst="rect">
+            <a:avLst/>
+          </a:prstGeom>
+          <a:noFill/>
+        </p:spPr>
+        <p:txBody>
+          <a:bodyPr wrap="square" rtlCol="0">
+            <a:spAutoFit/>
+          </a:bodyPr>
+          <a:lstStyle/>
+          <a:p>
+            <a:r>
+              <a:rPr lang="es-ES" dirty="0"/>
+              <a:t>Este  es el resumen del test</a:t>
+            </a:r>
+            <a:endParaRPr lang="es-CO" dirty="0"/>
+          </a:p>
+        </p:txBody>
+      </p:sp>
+      <p:pic>
+        <p:nvPicPr>
+          <p:cNvPr id="9" name="Imagen 8">
+            <a:extLst>
+              <a:ext uri="{FF2B5EF4-FFF2-40B4-BE49-F238E27FC236}">
+                <a16:creationId xmlns:a16="http://schemas.microsoft.com/office/drawing/2014/main" id="{C96EE99B-0571-49A1-BE74-6EA900BCA810}"/>
+              </a:ext>
+            </a:extLst>
+          </p:cNvPr>
+          <p:cNvPicPr>
+            <a:picLocks noChangeAspect="1"/>
+          </p:cNvPicPr>
+          <p:nvPr/>
+        </p:nvPicPr>
+        <p:blipFill>
+          <a:blip r:embed="rId3"/>
+          <a:stretch>
+            <a:fillRect/>
+          </a:stretch>
+        </p:blipFill>
+        <p:spPr>
+          <a:xfrm>
+            <a:off x="7430443" y="1348854"/>
+            <a:ext cx="4605265" cy="2637519"/>
+          </a:xfrm>
+          <a:prstGeom prst="rect">
+            <a:avLst/>
+          </a:prstGeom>
+        </p:spPr>
+      </p:pic>
+      <p:cxnSp>
+        <p:nvCxnSpPr>
+          <p:cNvPr id="11" name="Conector recto de flecha 10">
+            <a:extLst>
+              <a:ext uri="{FF2B5EF4-FFF2-40B4-BE49-F238E27FC236}">
+                <a16:creationId xmlns:a16="http://schemas.microsoft.com/office/drawing/2014/main" id="{1F75877E-4DAA-4735-8D67-705096013C88}"/>
+              </a:ext>
+            </a:extLst>
+          </p:cNvPr>
+          <p:cNvCxnSpPr>
+            <a:endCxn id="9" idx="1"/>
+          </p:cNvCxnSpPr>
+          <p:nvPr/>
+        </p:nvCxnSpPr>
+        <p:spPr>
+          <a:xfrm flipV="1">
+            <a:off x="4181582" y="2667614"/>
+            <a:ext cx="3248861" cy="760477"/>
+          </a:xfrm>
+          <a:prstGeom prst="straightConnector1">
+            <a:avLst/>
+          </a:prstGeom>
+          <a:ln w="38100">
+            <a:solidFill>
+              <a:srgbClr val="C00000"/>
+            </a:solidFill>
+            <a:tailEnd type="triangle"/>
+          </a:ln>
+        </p:spPr>
+        <p:style>
+          <a:lnRef idx="1">
+            <a:schemeClr val="accent1"/>
+          </a:lnRef>
+          <a:fillRef idx="0">
+            <a:schemeClr val="accent1"/>
+          </a:fillRef>
+          <a:effectRef idx="0">
+            <a:schemeClr val="accent1"/>
+          </a:effectRef>
+          <a:fontRef idx="minor">
+            <a:schemeClr val="tx1"/>
+          </a:fontRef>
+        </p:style>
+      </p:cxnSp>
+      <p:cxnSp>
+        <p:nvCxnSpPr>
+          <p:cNvPr id="12" name="Conector recto de flecha 11">
+            <a:extLst>
+              <a:ext uri="{FF2B5EF4-FFF2-40B4-BE49-F238E27FC236}">
+                <a16:creationId xmlns:a16="http://schemas.microsoft.com/office/drawing/2014/main" id="{5DD7C709-4A19-4AF7-AA83-67DF591DCFB1}"/>
+              </a:ext>
+            </a:extLst>
+          </p:cNvPr>
+          <p:cNvCxnSpPr>
+            <a:cxnSpLocks/>
+          </p:cNvCxnSpPr>
+          <p:nvPr/>
+        </p:nvCxnSpPr>
+        <p:spPr>
+          <a:xfrm flipV="1">
+            <a:off x="3501775" y="3428091"/>
+            <a:ext cx="3928668" cy="1235859"/>
+          </a:xfrm>
+          <a:prstGeom prst="straightConnector1">
+            <a:avLst/>
+          </a:prstGeom>
+          <a:ln w="38100">
+            <a:solidFill>
+              <a:srgbClr val="C00000"/>
+            </a:solidFill>
+            <a:tailEnd type="triangle"/>
+          </a:ln>
+        </p:spPr>
+        <p:style>
+          <a:lnRef idx="1">
+            <a:schemeClr val="accent1"/>
+          </a:lnRef>
+          <a:fillRef idx="0">
+            <a:schemeClr val="accent1"/>
+          </a:fillRef>
+          <a:effectRef idx="0">
+            <a:schemeClr val="accent1"/>
+          </a:effectRef>
+          <a:fontRef idx="minor">
+            <a:schemeClr val="tx1"/>
+          </a:fontRef>
+        </p:style>
+      </p:cxnSp>
+    </p:spTree>
+    <p:extLst>
+      <p:ext uri="{BB962C8B-B14F-4D97-AF65-F5344CB8AC3E}">
+        <p14:creationId xmlns:p14="http://schemas.microsoft.com/office/powerpoint/2010/main" val="1379626659"/>
+      </p:ext>
+    </p:extLst>
+  </p:cSld>
+  <p:clrMapOvr>
+    <a:masterClrMapping/>
+  </p:clrMapOvr>
+</p:sld>
+</file>
+
+<file path=ppt/slides/slide13.xml><?xml version="1.0" encoding="utf-8"?>
+<p:sld xmlns:a="http://schemas.openxmlformats.org/drawingml/2006/main" xmlns:r="http://schemas.openxmlformats.org/officeDocument/2006/relationships" xmlns:p="http://schemas.openxmlformats.org/presentationml/2006/main">
+  <p:cSld>
+    <p:spTree>
+      <p:nvGrpSpPr>
+        <p:cNvPr id="1" name=""/>
+        <p:cNvGrpSpPr/>
+        <p:nvPr/>
+      </p:nvGrpSpPr>
+      <p:grpSpPr>
+        <a:xfrm>
+          <a:off x="0" y="0"/>
+          <a:ext cx="0" cy="0"/>
+          <a:chOff x="0" y="0"/>
+          <a:chExt cx="0" cy="0"/>
+        </a:xfrm>
+      </p:grpSpPr>
+      <p:sp>
+        <p:nvSpPr>
+          <p:cNvPr id="5" name="Título 1">
+            <a:extLst>
+              <a:ext uri="{FF2B5EF4-FFF2-40B4-BE49-F238E27FC236}">
+                <a16:creationId xmlns:a16="http://schemas.microsoft.com/office/drawing/2014/main" id="{5FFF397D-20F7-4A47-B4F1-D5D28C4A99CD}"/>
+              </a:ext>
+            </a:extLst>
+          </p:cNvPr>
+          <p:cNvSpPr>
+            <a:spLocks noGrp="1"/>
+          </p:cNvSpPr>
+          <p:nvPr>
+            <p:ph type="title"/>
+          </p:nvPr>
+        </p:nvSpPr>
+        <p:spPr>
+          <a:xfrm>
+            <a:off x="838200" y="306560"/>
+            <a:ext cx="10515600" cy="1325563"/>
+          </a:xfrm>
+        </p:spPr>
+        <p:txBody>
+          <a:bodyPr>
+            <a:normAutofit/>
+          </a:bodyPr>
+          <a:lstStyle/>
+          <a:p>
+            <a:r>
+              <a:rPr lang="es-ES" sz="3600" dirty="0"/>
+              <a:t>Cómo revisar lo que falló en el repositorio del taller enviado</a:t>
+            </a:r>
+            <a:endParaRPr lang="es-CO" sz="3600" dirty="0"/>
+          </a:p>
+        </p:txBody>
+      </p:sp>
+      <p:pic>
+        <p:nvPicPr>
+          <p:cNvPr id="1026" name="Picture 2">
+            <a:extLst>
+              <a:ext uri="{FF2B5EF4-FFF2-40B4-BE49-F238E27FC236}">
+                <a16:creationId xmlns:a16="http://schemas.microsoft.com/office/drawing/2014/main" id="{99A28508-3F9E-4387-9B71-7003CEA1ADF0}"/>
+              </a:ext>
+            </a:extLst>
+          </p:cNvPr>
+          <p:cNvPicPr>
+            <a:picLocks noChangeAspect="1" noChangeArrowheads="1"/>
+          </p:cNvPicPr>
+          <p:nvPr/>
+        </p:nvPicPr>
+        <p:blipFill>
+          <a:blip r:embed="rId2">
+            <a:extLst>
+              <a:ext uri="{28A0092B-C50C-407E-A947-70E740481C1C}">
+                <a14:useLocalDpi xmlns:a14="http://schemas.microsoft.com/office/drawing/2010/main" val="0"/>
+              </a:ext>
+            </a:extLst>
+          </a:blip>
+          <a:srcRect/>
+          <a:stretch>
+            <a:fillRect/>
+          </a:stretch>
+        </p:blipFill>
+        <p:spPr bwMode="auto">
+          <a:xfrm>
+            <a:off x="872447" y="2140598"/>
+            <a:ext cx="8924817" cy="4289259"/>
+          </a:xfrm>
+          <a:prstGeom prst="rect">
+            <a:avLst/>
+          </a:prstGeom>
+          <a:noFill/>
+          <a:extLst>
+            <a:ext uri="{909E8E84-426E-40DD-AFC4-6F175D3DCCD1}">
+              <a14:hiddenFill xmlns:a14="http://schemas.microsoft.com/office/drawing/2010/main">
+                <a:solidFill>
+                  <a:srgbClr val="FFFFFF"/>
+                </a:solidFill>
+              </a14:hiddenFill>
+            </a:ext>
+          </a:extLst>
+        </p:spPr>
+      </p:pic>
+      <p:sp>
+        <p:nvSpPr>
+          <p:cNvPr id="6" name="CuadroTexto 5">
+            <a:extLst>
+              <a:ext uri="{FF2B5EF4-FFF2-40B4-BE49-F238E27FC236}">
+                <a16:creationId xmlns:a16="http://schemas.microsoft.com/office/drawing/2014/main" id="{D0AF1578-FBD4-4D6B-ABF3-1D7F353BC427}"/>
+              </a:ext>
+            </a:extLst>
+          </p:cNvPr>
+          <p:cNvSpPr txBox="1"/>
+          <p:nvPr/>
+        </p:nvSpPr>
+        <p:spPr>
+          <a:xfrm>
+            <a:off x="3431568" y="1955932"/>
+            <a:ext cx="2455524" cy="369332"/>
+          </a:xfrm>
+          <a:prstGeom prst="rect">
+            <a:avLst/>
+          </a:prstGeom>
+          <a:noFill/>
+        </p:spPr>
+        <p:txBody>
+          <a:bodyPr wrap="square" rtlCol="0">
+            <a:spAutoFit/>
+          </a:bodyPr>
+          <a:lstStyle/>
+          <a:p>
+            <a:r>
+              <a:rPr lang="es-ES" dirty="0">
+                <a:solidFill>
+                  <a:srgbClr val="C00000"/>
+                </a:solidFill>
+              </a:rPr>
+              <a:t>Clic acá</a:t>
+            </a:r>
+            <a:endParaRPr lang="es-CO" dirty="0">
+              <a:solidFill>
+                <a:srgbClr val="C00000"/>
+              </a:solidFill>
+            </a:endParaRPr>
+          </a:p>
+        </p:txBody>
+      </p:sp>
+      <p:sp>
+        <p:nvSpPr>
+          <p:cNvPr id="8" name="CuadroTexto 7">
+            <a:extLst>
+              <a:ext uri="{FF2B5EF4-FFF2-40B4-BE49-F238E27FC236}">
+                <a16:creationId xmlns:a16="http://schemas.microsoft.com/office/drawing/2014/main" id="{04FDF15D-5619-43D0-AC75-0DF1687366F0}"/>
+              </a:ext>
+            </a:extLst>
+          </p:cNvPr>
+          <p:cNvSpPr txBox="1"/>
+          <p:nvPr/>
+        </p:nvSpPr>
+        <p:spPr>
+          <a:xfrm>
+            <a:off x="4210692" y="3886245"/>
+            <a:ext cx="6484706" cy="369332"/>
+          </a:xfrm>
+          <a:prstGeom prst="rect">
+            <a:avLst/>
+          </a:prstGeom>
+          <a:noFill/>
+        </p:spPr>
+        <p:txBody>
+          <a:bodyPr wrap="square" rtlCol="0">
+            <a:spAutoFit/>
+          </a:bodyPr>
+          <a:lstStyle/>
+          <a:p>
+            <a:r>
+              <a:rPr lang="es-ES" dirty="0">
+                <a:solidFill>
+                  <a:srgbClr val="C00000"/>
+                </a:solidFill>
+              </a:rPr>
+              <a:t>Asegurarse de seleccionar el </a:t>
+            </a:r>
+            <a:r>
+              <a:rPr lang="es-ES" dirty="0" err="1">
+                <a:solidFill>
+                  <a:srgbClr val="C00000"/>
+                </a:solidFill>
+              </a:rPr>
+              <a:t>commit</a:t>
+            </a:r>
+            <a:r>
+              <a:rPr lang="es-ES" dirty="0">
+                <a:solidFill>
+                  <a:srgbClr val="C00000"/>
+                </a:solidFill>
+              </a:rPr>
+              <a:t> que se va a revisar</a:t>
+            </a:r>
+            <a:endParaRPr lang="es-CO" dirty="0">
+              <a:solidFill>
+                <a:srgbClr val="C00000"/>
+              </a:solidFill>
+            </a:endParaRPr>
+          </a:p>
+        </p:txBody>
+      </p:sp>
+    </p:spTree>
+    <p:extLst>
+      <p:ext uri="{BB962C8B-B14F-4D97-AF65-F5344CB8AC3E}">
+        <p14:creationId xmlns:p14="http://schemas.microsoft.com/office/powerpoint/2010/main" val="102662072"/>
+      </p:ext>
+    </p:extLst>
+  </p:cSld>
+  <p:clrMapOvr>
+    <a:masterClrMapping/>
+  </p:clrMapOvr>
+</p:sld>
+</file>
+
+<file path=ppt/slides/slide14.xml><?xml version="1.0" encoding="utf-8"?>
+<p:sld xmlns:a="http://schemas.openxmlformats.org/drawingml/2006/main" xmlns:r="http://schemas.openxmlformats.org/officeDocument/2006/relationships" xmlns:p="http://schemas.openxmlformats.org/presentationml/2006/main">
+  <p:cSld>
+    <p:spTree>
+      <p:nvGrpSpPr>
+        <p:cNvPr id="1" name=""/>
+        <p:cNvGrpSpPr/>
+        <p:nvPr/>
+      </p:nvGrpSpPr>
+      <p:grpSpPr>
+        <a:xfrm>
+          <a:off x="0" y="0"/>
+          <a:ext cx="0" cy="0"/>
+          <a:chOff x="0" y="0"/>
+          <a:chExt cx="0" cy="0"/>
+        </a:xfrm>
+      </p:grpSpPr>
+      <p:pic>
+        <p:nvPicPr>
+          <p:cNvPr id="2050" name="Picture 2">
+            <a:extLst>
+              <a:ext uri="{FF2B5EF4-FFF2-40B4-BE49-F238E27FC236}">
+                <a16:creationId xmlns:a16="http://schemas.microsoft.com/office/drawing/2014/main" id="{76EBA8C0-110B-4C61-B7FC-F9FA214E74F6}"/>
+              </a:ext>
+            </a:extLst>
+          </p:cNvPr>
+          <p:cNvPicPr>
+            <a:picLocks noChangeAspect="1" noChangeArrowheads="1"/>
+          </p:cNvPicPr>
+          <p:nvPr/>
+        </p:nvPicPr>
+        <p:blipFill>
+          <a:blip r:embed="rId2">
+            <a:extLst>
+              <a:ext uri="{28A0092B-C50C-407E-A947-70E740481C1C}">
+                <a14:useLocalDpi xmlns:a14="http://schemas.microsoft.com/office/drawing/2010/main" val="0"/>
+              </a:ext>
+            </a:extLst>
+          </a:blip>
+          <a:srcRect/>
+          <a:stretch>
+            <a:fillRect/>
+          </a:stretch>
+        </p:blipFill>
+        <p:spPr bwMode="auto">
+          <a:xfrm>
+            <a:off x="256853" y="1690688"/>
+            <a:ext cx="7789096" cy="4522701"/>
+          </a:xfrm>
+          <a:prstGeom prst="rect">
+            <a:avLst/>
+          </a:prstGeom>
+          <a:noFill/>
+          <a:extLst>
+            <a:ext uri="{909E8E84-426E-40DD-AFC4-6F175D3DCCD1}">
+              <a14:hiddenFill xmlns:a14="http://schemas.microsoft.com/office/drawing/2010/main">
+                <a:solidFill>
+                  <a:srgbClr val="FFFFFF"/>
+                </a:solidFill>
+              </a14:hiddenFill>
+            </a:ext>
+          </a:extLst>
+        </p:spPr>
+      </p:pic>
+      <p:sp>
+        <p:nvSpPr>
+          <p:cNvPr id="5" name="CuadroTexto 4">
+            <a:extLst>
+              <a:ext uri="{FF2B5EF4-FFF2-40B4-BE49-F238E27FC236}">
+                <a16:creationId xmlns:a16="http://schemas.microsoft.com/office/drawing/2014/main" id="{862CC499-CC3B-4AEC-88EB-61B6F4A3FEBE}"/>
+              </a:ext>
+            </a:extLst>
+          </p:cNvPr>
+          <p:cNvSpPr txBox="1"/>
+          <p:nvPr/>
+        </p:nvSpPr>
+        <p:spPr>
+          <a:xfrm>
+            <a:off x="4303158" y="4589305"/>
+            <a:ext cx="2210657" cy="369332"/>
+          </a:xfrm>
+          <a:prstGeom prst="rect">
+            <a:avLst/>
+          </a:prstGeom>
+          <a:noFill/>
+        </p:spPr>
+        <p:txBody>
+          <a:bodyPr wrap="square" rtlCol="0">
+            <a:spAutoFit/>
+          </a:bodyPr>
+          <a:lstStyle/>
+          <a:p>
+            <a:r>
+              <a:rPr lang="es-ES" dirty="0">
+                <a:solidFill>
+                  <a:srgbClr val="C00000"/>
+                </a:solidFill>
+              </a:rPr>
+              <a:t>Clic en </a:t>
+            </a:r>
+            <a:r>
+              <a:rPr lang="es-ES" dirty="0" err="1">
+                <a:solidFill>
+                  <a:srgbClr val="C00000"/>
+                </a:solidFill>
+              </a:rPr>
+              <a:t>details</a:t>
+            </a:r>
+            <a:endParaRPr lang="es-CO" dirty="0">
+              <a:solidFill>
+                <a:srgbClr val="C00000"/>
+              </a:solidFill>
+            </a:endParaRPr>
+          </a:p>
+        </p:txBody>
+      </p:sp>
+      <p:cxnSp>
+        <p:nvCxnSpPr>
+          <p:cNvPr id="6" name="Conector recto de flecha 5">
+            <a:extLst>
+              <a:ext uri="{FF2B5EF4-FFF2-40B4-BE49-F238E27FC236}">
+                <a16:creationId xmlns:a16="http://schemas.microsoft.com/office/drawing/2014/main" id="{32605948-3DA4-4DCC-B6D0-4306DE34C3D4}"/>
+              </a:ext>
+            </a:extLst>
+          </p:cNvPr>
+          <p:cNvCxnSpPr/>
+          <p:nvPr/>
+        </p:nvCxnSpPr>
+        <p:spPr>
+          <a:xfrm>
+            <a:off x="5270642" y="5065160"/>
+            <a:ext cx="873304" cy="462337"/>
+          </a:xfrm>
+          <a:prstGeom prst="straightConnector1">
+            <a:avLst/>
+          </a:prstGeom>
+          <a:ln w="38100">
+            <a:solidFill>
+              <a:srgbClr val="C00000"/>
+            </a:solidFill>
+            <a:tailEnd type="triangle"/>
+          </a:ln>
+        </p:spPr>
+        <p:style>
+          <a:lnRef idx="1">
+            <a:schemeClr val="accent1"/>
+          </a:lnRef>
+          <a:fillRef idx="0">
+            <a:schemeClr val="accent1"/>
+          </a:fillRef>
+          <a:effectRef idx="0">
+            <a:schemeClr val="accent1"/>
+          </a:effectRef>
+          <a:fontRef idx="minor">
+            <a:schemeClr val="tx1"/>
+          </a:fontRef>
+        </p:style>
+      </p:cxnSp>
+      <p:sp>
+        <p:nvSpPr>
+          <p:cNvPr id="8" name="CuadroTexto 7">
+            <a:extLst>
+              <a:ext uri="{FF2B5EF4-FFF2-40B4-BE49-F238E27FC236}">
+                <a16:creationId xmlns:a16="http://schemas.microsoft.com/office/drawing/2014/main" id="{39BD4229-5782-49CC-B621-686655D2F1FA}"/>
+              </a:ext>
+            </a:extLst>
+          </p:cNvPr>
+          <p:cNvSpPr txBox="1"/>
+          <p:nvPr/>
+        </p:nvSpPr>
+        <p:spPr>
+          <a:xfrm>
+            <a:off x="256853" y="5625690"/>
+            <a:ext cx="1828800" cy="369332"/>
+          </a:xfrm>
+          <a:prstGeom prst="rect">
+            <a:avLst/>
+          </a:prstGeom>
+          <a:noFill/>
+        </p:spPr>
+        <p:txBody>
+          <a:bodyPr wrap="square" rtlCol="0">
+            <a:spAutoFit/>
+          </a:bodyPr>
+          <a:lstStyle/>
+          <a:p>
+            <a:r>
+              <a:rPr lang="es-ES" dirty="0">
+                <a:solidFill>
+                  <a:srgbClr val="C00000"/>
+                </a:solidFill>
+              </a:rPr>
+              <a:t>Ir a esta sección:</a:t>
+            </a:r>
+            <a:endParaRPr lang="es-CO" dirty="0">
+              <a:solidFill>
+                <a:srgbClr val="C00000"/>
+              </a:solidFill>
+            </a:endParaRPr>
+          </a:p>
+        </p:txBody>
+      </p:sp>
+      <p:sp>
+        <p:nvSpPr>
+          <p:cNvPr id="9" name="Título 1">
+            <a:extLst>
+              <a:ext uri="{FF2B5EF4-FFF2-40B4-BE49-F238E27FC236}">
+                <a16:creationId xmlns:a16="http://schemas.microsoft.com/office/drawing/2014/main" id="{9DDE2B5A-3D57-4D4F-9B1B-D243D14C205D}"/>
+              </a:ext>
+            </a:extLst>
+          </p:cNvPr>
+          <p:cNvSpPr>
+            <a:spLocks noGrp="1"/>
+          </p:cNvSpPr>
+          <p:nvPr>
+            <p:ph type="title"/>
+          </p:nvPr>
+        </p:nvSpPr>
+        <p:spPr>
+          <a:xfrm>
+            <a:off x="838200" y="365125"/>
+            <a:ext cx="10515600" cy="1325563"/>
+          </a:xfrm>
+        </p:spPr>
+        <p:txBody>
+          <a:bodyPr>
+            <a:normAutofit/>
+          </a:bodyPr>
+          <a:lstStyle/>
+          <a:p>
+            <a:r>
+              <a:rPr lang="es-ES" sz="3600" dirty="0"/>
+              <a:t>Cómo revisar lo que falló en el repositorio del taller enviado</a:t>
+            </a:r>
+            <a:endParaRPr lang="es-CO" sz="3600" dirty="0"/>
+          </a:p>
+        </p:txBody>
+      </p:sp>
+      <p:pic>
+        <p:nvPicPr>
+          <p:cNvPr id="7" name="Imagen 6">
+            <a:extLst>
+              <a:ext uri="{FF2B5EF4-FFF2-40B4-BE49-F238E27FC236}">
+                <a16:creationId xmlns:a16="http://schemas.microsoft.com/office/drawing/2014/main" id="{3EA25E9C-88A7-42AA-B294-322EA975E86F}"/>
+              </a:ext>
+            </a:extLst>
+          </p:cNvPr>
+          <p:cNvPicPr>
+            <a:picLocks noChangeAspect="1"/>
+          </p:cNvPicPr>
+          <p:nvPr/>
+        </p:nvPicPr>
+        <p:blipFill>
+          <a:blip r:embed="rId3"/>
+          <a:stretch>
+            <a:fillRect/>
+          </a:stretch>
+        </p:blipFill>
+        <p:spPr>
+          <a:xfrm>
+            <a:off x="7762166" y="2842277"/>
+            <a:ext cx="3875417" cy="2219522"/>
+          </a:xfrm>
+          <a:prstGeom prst="rect">
+            <a:avLst/>
+          </a:prstGeom>
+        </p:spPr>
+      </p:pic>
+      <p:cxnSp>
+        <p:nvCxnSpPr>
+          <p:cNvPr id="3" name="Conector recto de flecha 2">
+            <a:extLst>
+              <a:ext uri="{FF2B5EF4-FFF2-40B4-BE49-F238E27FC236}">
+                <a16:creationId xmlns:a16="http://schemas.microsoft.com/office/drawing/2014/main" id="{E32D983C-39C6-4413-ACAB-2B7F721E7FD2}"/>
+              </a:ext>
+            </a:extLst>
+          </p:cNvPr>
+          <p:cNvCxnSpPr/>
+          <p:nvPr/>
+        </p:nvCxnSpPr>
+        <p:spPr>
+          <a:xfrm flipV="1">
+            <a:off x="6369978" y="4037744"/>
+            <a:ext cx="1222624" cy="1587946"/>
+          </a:xfrm>
+          <a:prstGeom prst="straightConnector1">
+            <a:avLst/>
+          </a:prstGeom>
+          <a:ln w="38100">
+            <a:solidFill>
+              <a:srgbClr val="C00000"/>
+            </a:solidFill>
+            <a:tailEnd type="triangle"/>
+          </a:ln>
+        </p:spPr>
+        <p:style>
+          <a:lnRef idx="1">
+            <a:schemeClr val="accent1"/>
+          </a:lnRef>
+          <a:fillRef idx="0">
+            <a:schemeClr val="accent1"/>
+          </a:fillRef>
+          <a:effectRef idx="0">
+            <a:schemeClr val="accent1"/>
+          </a:effectRef>
+          <a:fontRef idx="minor">
+            <a:schemeClr val="tx1"/>
+          </a:fontRef>
+        </p:style>
+      </p:cxnSp>
+    </p:spTree>
+    <p:extLst>
+      <p:ext uri="{BB962C8B-B14F-4D97-AF65-F5344CB8AC3E}">
+        <p14:creationId xmlns:p14="http://schemas.microsoft.com/office/powerpoint/2010/main" val="3710720232"/>
+      </p:ext>
+    </p:extLst>
+  </p:cSld>
+  <p:clrMapOvr>
+    <a:masterClrMapping/>
+  </p:clrMapOvr>
+</p:sld>
+</file>
+
+<file path=ppt/slides/slide15.xml><?xml version="1.0" encoding="utf-8"?>
+<p:sld xmlns:a="http://schemas.openxmlformats.org/drawingml/2006/main" xmlns:r="http://schemas.openxmlformats.org/officeDocument/2006/relationships" xmlns:p="http://schemas.openxmlformats.org/presentationml/2006/main">
+  <p:cSld>
+    <p:spTree>
+      <p:nvGrpSpPr>
+        <p:cNvPr id="1" name=""/>
+        <p:cNvGrpSpPr/>
+        <p:nvPr/>
+      </p:nvGrpSpPr>
+      <p:grpSpPr>
+        <a:xfrm>
+          <a:off x="0" y="0"/>
+          <a:ext cx="0" cy="0"/>
+          <a:chOff x="0" y="0"/>
+          <a:chExt cx="0" cy="0"/>
+        </a:xfrm>
+      </p:grpSpPr>
+      <p:sp>
+        <p:nvSpPr>
+          <p:cNvPr id="4" name="Título 1">
+            <a:extLst>
+              <a:ext uri="{FF2B5EF4-FFF2-40B4-BE49-F238E27FC236}">
+                <a16:creationId xmlns:a16="http://schemas.microsoft.com/office/drawing/2014/main" id="{1F0488B3-AAD4-4DF3-855C-4A0E42FB8601}"/>
+              </a:ext>
+            </a:extLst>
+          </p:cNvPr>
+          <p:cNvSpPr txBox="1">
+            <a:spLocks/>
+          </p:cNvSpPr>
+          <p:nvPr/>
+        </p:nvSpPr>
+        <p:spPr>
+          <a:xfrm>
+            <a:off x="990600" y="517525"/>
+            <a:ext cx="10515600" cy="1325563"/>
+          </a:xfrm>
+          <a:prstGeom prst="rect">
+            <a:avLst/>
+          </a:prstGeom>
+        </p:spPr>
+        <p:txBody>
+          <a:bodyPr vert="horz" lIns="91440" tIns="45720" rIns="91440" bIns="45720" rtlCol="0" anchor="ctr">
+            <a:normAutofit/>
+          </a:bodyPr>
+          <a:lstStyle>
+            <a:lvl1pPr algn="l" defTabSz="914400" rtl="0" eaLnBrk="1" latinLnBrk="0" hangingPunct="1">
+              <a:lnSpc>
+                <a:spcPct val="90000"/>
+              </a:lnSpc>
+              <a:spcBef>
+                <a:spcPct val="0"/>
+              </a:spcBef>
+              <a:buNone/>
+              <a:defRPr sz="4400" kern="1200">
+                <a:solidFill>
+                  <a:schemeClr val="tx1"/>
+                </a:solidFill>
+                <a:latin typeface="+mj-lt"/>
+                <a:ea typeface="+mj-ea"/>
+                <a:cs typeface="+mj-cs"/>
+              </a:defRPr>
+            </a:lvl1pPr>
+          </a:lstStyle>
+          <a:p>
+            <a:r>
+              <a:rPr lang="es-ES" sz="3600" dirty="0"/>
+              <a:t>Hacer Seguimiento a los </a:t>
+            </a:r>
+            <a:r>
+              <a:rPr lang="es-ES" sz="3600" dirty="0" err="1"/>
+              <a:t>commit</a:t>
+            </a:r>
+            <a:r>
+              <a:rPr lang="es-ES" sz="3600" dirty="0"/>
+              <a:t> hasta que esté bueno el taller</a:t>
+            </a:r>
+            <a:endParaRPr lang="es-CO" sz="3600" dirty="0"/>
+          </a:p>
+        </p:txBody>
+      </p:sp>
+      <p:pic>
+        <p:nvPicPr>
+          <p:cNvPr id="6" name="Imagen 5">
+            <a:extLst>
+              <a:ext uri="{FF2B5EF4-FFF2-40B4-BE49-F238E27FC236}">
+                <a16:creationId xmlns:a16="http://schemas.microsoft.com/office/drawing/2014/main" id="{7BBE63E5-3938-4B67-9D65-FCB80699AC3E}"/>
+              </a:ext>
+            </a:extLst>
+          </p:cNvPr>
+          <p:cNvPicPr>
+            <a:picLocks noChangeAspect="1"/>
+          </p:cNvPicPr>
+          <p:nvPr/>
+        </p:nvPicPr>
+        <p:blipFill>
+          <a:blip r:embed="rId2"/>
+          <a:stretch>
+            <a:fillRect/>
+          </a:stretch>
+        </p:blipFill>
+        <p:spPr>
+          <a:xfrm>
+            <a:off x="922106" y="1843088"/>
+            <a:ext cx="5817741" cy="2408908"/>
+          </a:xfrm>
+          <a:prstGeom prst="rect">
+            <a:avLst/>
+          </a:prstGeom>
+        </p:spPr>
+      </p:pic>
+      <p:sp>
+        <p:nvSpPr>
+          <p:cNvPr id="7" name="CuadroTexto 6">
+            <a:extLst>
+              <a:ext uri="{FF2B5EF4-FFF2-40B4-BE49-F238E27FC236}">
+                <a16:creationId xmlns:a16="http://schemas.microsoft.com/office/drawing/2014/main" id="{FFA9DB32-0661-46F0-8942-1B81EFFC3C33}"/>
+              </a:ext>
+            </a:extLst>
+          </p:cNvPr>
+          <p:cNvSpPr txBox="1"/>
+          <p:nvPr/>
+        </p:nvSpPr>
+        <p:spPr>
+          <a:xfrm>
+            <a:off x="3873357" y="2353051"/>
+            <a:ext cx="2128018" cy="369332"/>
+          </a:xfrm>
+          <a:prstGeom prst="rect">
+            <a:avLst/>
+          </a:prstGeom>
+          <a:noFill/>
+        </p:spPr>
+        <p:txBody>
+          <a:bodyPr wrap="none" rtlCol="0">
+            <a:spAutoFit/>
+          </a:bodyPr>
+          <a:lstStyle/>
+          <a:p>
+            <a:r>
+              <a:rPr lang="es-ES" b="1" dirty="0">
+                <a:solidFill>
+                  <a:srgbClr val="FF0000"/>
+                </a:solidFill>
+              </a:rPr>
+              <a:t>CLIC, en </a:t>
+            </a:r>
+            <a:r>
+              <a:rPr lang="es-ES" b="1" dirty="0" err="1">
+                <a:solidFill>
+                  <a:srgbClr val="FF0000"/>
+                </a:solidFill>
+              </a:rPr>
+              <a:t>pull</a:t>
+            </a:r>
+            <a:r>
+              <a:rPr lang="es-ES" b="1" dirty="0">
+                <a:solidFill>
+                  <a:srgbClr val="FF0000"/>
+                </a:solidFill>
+              </a:rPr>
+              <a:t> </a:t>
+            </a:r>
+            <a:r>
+              <a:rPr lang="es-ES" b="1" dirty="0" err="1">
+                <a:solidFill>
+                  <a:srgbClr val="FF0000"/>
+                </a:solidFill>
+              </a:rPr>
+              <a:t>request</a:t>
+            </a:r>
+            <a:endParaRPr lang="es-CO" b="1" dirty="0">
+              <a:solidFill>
+                <a:srgbClr val="FF0000"/>
+              </a:solidFill>
+            </a:endParaRPr>
+          </a:p>
+        </p:txBody>
+      </p:sp>
+      <p:sp>
+        <p:nvSpPr>
+          <p:cNvPr id="8" name="CuadroTexto 7">
+            <a:extLst>
+              <a:ext uri="{FF2B5EF4-FFF2-40B4-BE49-F238E27FC236}">
+                <a16:creationId xmlns:a16="http://schemas.microsoft.com/office/drawing/2014/main" id="{49E2AB0B-FAC0-48EB-AD27-1B1E27C879BC}"/>
+              </a:ext>
+            </a:extLst>
+          </p:cNvPr>
+          <p:cNvSpPr txBox="1"/>
+          <p:nvPr/>
+        </p:nvSpPr>
+        <p:spPr>
+          <a:xfrm>
+            <a:off x="3318552" y="1505604"/>
+            <a:ext cx="4330353" cy="369332"/>
+          </a:xfrm>
+          <a:prstGeom prst="rect">
+            <a:avLst/>
+          </a:prstGeom>
+          <a:noFill/>
+        </p:spPr>
+        <p:txBody>
+          <a:bodyPr wrap="none" rtlCol="0">
+            <a:spAutoFit/>
+          </a:bodyPr>
+          <a:lstStyle/>
+          <a:p>
+            <a:r>
+              <a:rPr lang="es-ES" dirty="0"/>
+              <a:t>Estando en el taller que estás desarrollando </a:t>
+            </a:r>
+            <a:endParaRPr lang="es-CO" dirty="0"/>
+          </a:p>
+        </p:txBody>
+      </p:sp>
+      <p:pic>
+        <p:nvPicPr>
+          <p:cNvPr id="10" name="Imagen 9">
+            <a:extLst>
+              <a:ext uri="{FF2B5EF4-FFF2-40B4-BE49-F238E27FC236}">
+                <a16:creationId xmlns:a16="http://schemas.microsoft.com/office/drawing/2014/main" id="{CDF1DEA8-DEE8-4486-AD36-897C09EEDE0B}"/>
+              </a:ext>
+            </a:extLst>
+          </p:cNvPr>
+          <p:cNvPicPr>
+            <a:picLocks noChangeAspect="1"/>
+          </p:cNvPicPr>
+          <p:nvPr/>
+        </p:nvPicPr>
+        <p:blipFill>
+          <a:blip r:embed="rId3"/>
+          <a:stretch>
+            <a:fillRect/>
+          </a:stretch>
+        </p:blipFill>
+        <p:spPr>
+          <a:xfrm>
+            <a:off x="7243787" y="3006703"/>
+            <a:ext cx="4026107" cy="844593"/>
+          </a:xfrm>
+          <a:prstGeom prst="rect">
+            <a:avLst/>
+          </a:prstGeom>
+        </p:spPr>
+      </p:pic>
+      <p:cxnSp>
+        <p:nvCxnSpPr>
+          <p:cNvPr id="12" name="Conector recto de flecha 11">
+            <a:extLst>
+              <a:ext uri="{FF2B5EF4-FFF2-40B4-BE49-F238E27FC236}">
+                <a16:creationId xmlns:a16="http://schemas.microsoft.com/office/drawing/2014/main" id="{0F016BC9-E6B9-4917-B852-A3B005632869}"/>
+              </a:ext>
+            </a:extLst>
+          </p:cNvPr>
+          <p:cNvCxnSpPr/>
+          <p:nvPr/>
+        </p:nvCxnSpPr>
+        <p:spPr>
+          <a:xfrm>
+            <a:off x="3729519" y="3174715"/>
+            <a:ext cx="3359650" cy="254284"/>
+          </a:xfrm>
+          <a:prstGeom prst="straightConnector1">
+            <a:avLst/>
+          </a:prstGeom>
+          <a:ln w="38100">
+            <a:tailEnd type="triangle"/>
+          </a:ln>
+        </p:spPr>
+        <p:style>
+          <a:lnRef idx="1">
+            <a:schemeClr val="accent1"/>
+          </a:lnRef>
+          <a:fillRef idx="0">
+            <a:schemeClr val="accent1"/>
+          </a:fillRef>
+          <a:effectRef idx="0">
+            <a:schemeClr val="accent1"/>
+          </a:effectRef>
+          <a:fontRef idx="minor">
+            <a:schemeClr val="tx1"/>
+          </a:fontRef>
+        </p:style>
+      </p:cxnSp>
+      <p:sp>
+        <p:nvSpPr>
+          <p:cNvPr id="13" name="CuadroTexto 12">
+            <a:extLst>
+              <a:ext uri="{FF2B5EF4-FFF2-40B4-BE49-F238E27FC236}">
+                <a16:creationId xmlns:a16="http://schemas.microsoft.com/office/drawing/2014/main" id="{D42E6BA6-D8EE-4513-8AC9-4279DC7D1E67}"/>
+              </a:ext>
+            </a:extLst>
+          </p:cNvPr>
+          <p:cNvSpPr txBox="1"/>
+          <p:nvPr/>
+        </p:nvSpPr>
+        <p:spPr>
+          <a:xfrm>
+            <a:off x="7243787" y="2308311"/>
+            <a:ext cx="5681103" cy="369332"/>
+          </a:xfrm>
+          <a:prstGeom prst="rect">
+            <a:avLst/>
+          </a:prstGeom>
+          <a:noFill/>
+        </p:spPr>
+        <p:txBody>
+          <a:bodyPr wrap="square" rtlCol="0">
+            <a:spAutoFit/>
+          </a:bodyPr>
+          <a:lstStyle/>
+          <a:p>
+            <a:r>
+              <a:rPr lang="es-ES" dirty="0"/>
+              <a:t>Luego seleccionas </a:t>
+            </a:r>
+            <a:r>
+              <a:rPr lang="es-ES" dirty="0" err="1"/>
+              <a:t>Feedback</a:t>
+            </a:r>
+            <a:endParaRPr lang="es-CO" dirty="0"/>
+          </a:p>
+        </p:txBody>
+      </p:sp>
+      <p:sp>
+        <p:nvSpPr>
+          <p:cNvPr id="15" name="CuadroTexto 14">
+            <a:extLst>
+              <a:ext uri="{FF2B5EF4-FFF2-40B4-BE49-F238E27FC236}">
+                <a16:creationId xmlns:a16="http://schemas.microsoft.com/office/drawing/2014/main" id="{293CF942-10A2-4AE2-939B-1FBF8F13C9D1}"/>
+              </a:ext>
+            </a:extLst>
+          </p:cNvPr>
+          <p:cNvSpPr txBox="1"/>
+          <p:nvPr/>
+        </p:nvSpPr>
+        <p:spPr>
+          <a:xfrm>
+            <a:off x="990599" y="4589480"/>
+            <a:ext cx="2327953" cy="1477328"/>
+          </a:xfrm>
+          <a:prstGeom prst="rect">
+            <a:avLst/>
+          </a:prstGeom>
+          <a:noFill/>
+        </p:spPr>
+        <p:txBody>
+          <a:bodyPr wrap="square">
+            <a:spAutoFit/>
+          </a:bodyPr>
+          <a:lstStyle/>
+          <a:p>
+            <a:r>
+              <a:rPr lang="es-ES" dirty="0"/>
+              <a:t>Aparecen todos los </a:t>
+            </a:r>
+            <a:r>
+              <a:rPr lang="es-ES" dirty="0" err="1"/>
+              <a:t>commit</a:t>
+            </a:r>
+            <a:r>
+              <a:rPr lang="es-ES" dirty="0"/>
+              <a:t> que hiciste, con su correspondiente evaluación</a:t>
+            </a:r>
+            <a:endParaRPr lang="es-CO" dirty="0"/>
+          </a:p>
+        </p:txBody>
+      </p:sp>
+      <p:pic>
+        <p:nvPicPr>
+          <p:cNvPr id="17" name="Imagen 16">
+            <a:extLst>
+              <a:ext uri="{FF2B5EF4-FFF2-40B4-BE49-F238E27FC236}">
+                <a16:creationId xmlns:a16="http://schemas.microsoft.com/office/drawing/2014/main" id="{A9E5F335-20F5-497A-BD86-81D3782A6C7B}"/>
+              </a:ext>
+            </a:extLst>
+          </p:cNvPr>
+          <p:cNvPicPr>
+            <a:picLocks noChangeAspect="1"/>
+          </p:cNvPicPr>
+          <p:nvPr/>
+        </p:nvPicPr>
+        <p:blipFill>
+          <a:blip r:embed="rId4"/>
+          <a:stretch>
+            <a:fillRect/>
+          </a:stretch>
+        </p:blipFill>
+        <p:spPr>
+          <a:xfrm>
+            <a:off x="5215213" y="4173194"/>
+            <a:ext cx="5908418" cy="2424923"/>
+          </a:xfrm>
+          <a:prstGeom prst="rect">
+            <a:avLst/>
+          </a:prstGeom>
+        </p:spPr>
+      </p:pic>
+      <p:cxnSp>
+        <p:nvCxnSpPr>
+          <p:cNvPr id="18" name="Conector recto de flecha 17">
+            <a:extLst>
+              <a:ext uri="{FF2B5EF4-FFF2-40B4-BE49-F238E27FC236}">
+                <a16:creationId xmlns:a16="http://schemas.microsoft.com/office/drawing/2014/main" id="{02AE57FB-8FB8-4F1C-86E5-734B64501E6D}"/>
+              </a:ext>
+            </a:extLst>
+          </p:cNvPr>
+          <p:cNvCxnSpPr>
+            <a:cxnSpLocks/>
+          </p:cNvCxnSpPr>
+          <p:nvPr/>
+        </p:nvCxnSpPr>
+        <p:spPr>
+          <a:xfrm flipH="1">
+            <a:off x="2784297" y="3534310"/>
+            <a:ext cx="4633645" cy="2213237"/>
+          </a:xfrm>
+          <a:prstGeom prst="straightConnector1">
+            <a:avLst/>
+          </a:prstGeom>
+          <a:ln w="38100">
+            <a:tailEnd type="triangle"/>
+          </a:ln>
+        </p:spPr>
+        <p:style>
+          <a:lnRef idx="1">
+            <a:schemeClr val="accent1"/>
+          </a:lnRef>
+          <a:fillRef idx="0">
+            <a:schemeClr val="accent1"/>
+          </a:fillRef>
+          <a:effectRef idx="0">
+            <a:schemeClr val="accent1"/>
+          </a:effectRef>
+          <a:fontRef idx="minor">
+            <a:schemeClr val="tx1"/>
+          </a:fontRef>
+        </p:style>
+      </p:cxnSp>
+      <p:sp>
+        <p:nvSpPr>
+          <p:cNvPr id="21" name="Elipse 20">
+            <a:extLst>
+              <a:ext uri="{FF2B5EF4-FFF2-40B4-BE49-F238E27FC236}">
+                <a16:creationId xmlns:a16="http://schemas.microsoft.com/office/drawing/2014/main" id="{F5E6BDE3-CBC3-4DD5-8823-39003F6FA1E4}"/>
+              </a:ext>
+            </a:extLst>
+          </p:cNvPr>
+          <p:cNvSpPr/>
+          <p:nvPr/>
+        </p:nvSpPr>
+        <p:spPr>
+          <a:xfrm>
+            <a:off x="5409344" y="6246688"/>
+            <a:ext cx="6096856" cy="351429"/>
+          </a:xfrm>
+          <a:prstGeom prst="ellipse">
+            <a:avLst/>
+          </a:prstGeom>
+          <a:noFill/>
+          <a:ln w="28575">
+            <a:solidFill>
+              <a:srgbClr val="00B050"/>
+            </a:solidFill>
+          </a:ln>
+        </p:spPr>
+        <p:style>
+          <a:lnRef idx="2">
+            <a:schemeClr val="accent1"/>
+          </a:lnRef>
+          <a:fillRef idx="1">
+            <a:schemeClr val="lt1"/>
+          </a:fillRef>
+          <a:effectRef idx="0">
+            <a:schemeClr val="accent1"/>
+          </a:effectRef>
+          <a:fontRef idx="minor">
+            <a:schemeClr val="dk1"/>
+          </a:fontRef>
+        </p:style>
+        <p:txBody>
+          <a:bodyPr rtlCol="0" anchor="ctr"/>
+          <a:lstStyle/>
+          <a:p>
+            <a:pPr algn="ctr"/>
+            <a:endParaRPr lang="es-CO"/>
+          </a:p>
+        </p:txBody>
+      </p:sp>
+      <p:sp>
+        <p:nvSpPr>
+          <p:cNvPr id="22" name="CuadroTexto 21">
+            <a:extLst>
+              <a:ext uri="{FF2B5EF4-FFF2-40B4-BE49-F238E27FC236}">
+                <a16:creationId xmlns:a16="http://schemas.microsoft.com/office/drawing/2014/main" id="{6DA11069-A8D2-4D3B-BCC6-80356370B44B}"/>
+              </a:ext>
+            </a:extLst>
+          </p:cNvPr>
+          <p:cNvSpPr txBox="1"/>
+          <p:nvPr/>
+        </p:nvSpPr>
+        <p:spPr>
+          <a:xfrm>
+            <a:off x="10764907" y="5924790"/>
+            <a:ext cx="1482585" cy="369332"/>
+          </a:xfrm>
+          <a:prstGeom prst="rect">
+            <a:avLst/>
+          </a:prstGeom>
+          <a:noFill/>
+        </p:spPr>
+        <p:txBody>
+          <a:bodyPr wrap="none" rtlCol="0">
+            <a:spAutoFit/>
+          </a:bodyPr>
+          <a:lstStyle/>
+          <a:p>
+            <a:r>
+              <a:rPr lang="es-ES" dirty="0"/>
+              <a:t>Coronamos!!!</a:t>
+            </a:r>
+            <a:endParaRPr lang="es-CO" dirty="0"/>
+          </a:p>
+        </p:txBody>
+      </p:sp>
+    </p:spTree>
+    <p:extLst>
+      <p:ext uri="{BB962C8B-B14F-4D97-AF65-F5344CB8AC3E}">
+        <p14:creationId xmlns:p14="http://schemas.microsoft.com/office/powerpoint/2010/main" val="2632171139"/>
       </p:ext>
     </p:extLst>
   </p:cSld>

</xml_diff>